<commit_message>
row vector and inner product 작성 중
</commit_message>
<xml_diff>
--- a/pics/2020-09-09-row_vector_and_inner_product/pics.pptx
+++ b/pics/2020-09-09-row_vector_and_inner_product/pics.pptx
@@ -6,6 +6,7 @@
   </p:sldMasterIdLst>
   <p:sldIdLst>
     <p:sldId id="256" r:id="rId2"/>
+    <p:sldId id="257" r:id="rId3"/>
   </p:sldIdLst>
   <p:sldSz cx="12192000" cy="6858000"/>
   <p:notesSz cx="6858000" cy="9144000"/>
@@ -129,7 +130,7 @@
           <p:cNvPr id="2" name="제목 1">
             <a:extLst>
               <a:ext uri="{FF2B5EF4-FFF2-40B4-BE49-F238E27FC236}">
-                <a16:creationId xmlns:a16="http://schemas.microsoft.com/office/drawing/2014/main" id="{14939E67-1FEF-4ED8-B681-6183CB155340}"/>
+                <a16:creationId xmlns="" xmlns:a16="http://schemas.microsoft.com/office/drawing/2014/main" id="{14939E67-1FEF-4ED8-B681-6183CB155340}"/>
               </a:ext>
             </a:extLst>
           </p:cNvPr>
@@ -166,7 +167,7 @@
           <p:cNvPr id="3" name="부제목 2">
             <a:extLst>
               <a:ext uri="{FF2B5EF4-FFF2-40B4-BE49-F238E27FC236}">
-                <a16:creationId xmlns:a16="http://schemas.microsoft.com/office/drawing/2014/main" id="{2B2A34EE-6038-4345-87CE-3AD77B915AED}"/>
+                <a16:creationId xmlns="" xmlns:a16="http://schemas.microsoft.com/office/drawing/2014/main" id="{2B2A34EE-6038-4345-87CE-3AD77B915AED}"/>
               </a:ext>
             </a:extLst>
           </p:cNvPr>
@@ -236,7 +237,7 @@
           <p:cNvPr id="4" name="날짜 개체 틀 3">
             <a:extLst>
               <a:ext uri="{FF2B5EF4-FFF2-40B4-BE49-F238E27FC236}">
-                <a16:creationId xmlns:a16="http://schemas.microsoft.com/office/drawing/2014/main" id="{CD209199-D670-48DB-8260-FAAF84DC1C3E}"/>
+                <a16:creationId xmlns="" xmlns:a16="http://schemas.microsoft.com/office/drawing/2014/main" id="{CD209199-D670-48DB-8260-FAAF84DC1C3E}"/>
               </a:ext>
             </a:extLst>
           </p:cNvPr>
@@ -254,7 +255,7 @@
           <a:p>
             <a:fld id="{534DC4C4-D2E4-46DD-99F3-0C8D8B74BDF6}" type="datetimeFigureOut">
               <a:rPr lang="ko-KR" altLang="en-US" smtClean="0"/>
-              <a:t>2020-09-12</a:t>
+              <a:t>2020-09-14</a:t>
             </a:fld>
             <a:endParaRPr lang="ko-KR" altLang="en-US"/>
           </a:p>
@@ -265,7 +266,7 @@
           <p:cNvPr id="5" name="바닥글 개체 틀 4">
             <a:extLst>
               <a:ext uri="{FF2B5EF4-FFF2-40B4-BE49-F238E27FC236}">
-                <a16:creationId xmlns:a16="http://schemas.microsoft.com/office/drawing/2014/main" id="{2D44BC76-89A3-4D4B-ACDB-4468F23F7CD3}"/>
+                <a16:creationId xmlns="" xmlns:a16="http://schemas.microsoft.com/office/drawing/2014/main" id="{2D44BC76-89A3-4D4B-ACDB-4468F23F7CD3}"/>
               </a:ext>
             </a:extLst>
           </p:cNvPr>
@@ -290,7 +291,7 @@
           <p:cNvPr id="6" name="슬라이드 번호 개체 틀 5">
             <a:extLst>
               <a:ext uri="{FF2B5EF4-FFF2-40B4-BE49-F238E27FC236}">
-                <a16:creationId xmlns:a16="http://schemas.microsoft.com/office/drawing/2014/main" id="{ED0B52DE-C4C4-4A97-85A4-CE0640DA468D}"/>
+                <a16:creationId xmlns="" xmlns:a16="http://schemas.microsoft.com/office/drawing/2014/main" id="{ED0B52DE-C4C4-4A97-85A4-CE0640DA468D}"/>
               </a:ext>
             </a:extLst>
           </p:cNvPr>
@@ -349,7 +350,7 @@
           <p:cNvPr id="2" name="제목 1">
             <a:extLst>
               <a:ext uri="{FF2B5EF4-FFF2-40B4-BE49-F238E27FC236}">
-                <a16:creationId xmlns:a16="http://schemas.microsoft.com/office/drawing/2014/main" id="{D31D58F0-6C6A-491D-AC40-C821AEB6679D}"/>
+                <a16:creationId xmlns="" xmlns:a16="http://schemas.microsoft.com/office/drawing/2014/main" id="{D31D58F0-6C6A-491D-AC40-C821AEB6679D}"/>
               </a:ext>
             </a:extLst>
           </p:cNvPr>
@@ -377,7 +378,7 @@
           <p:cNvPr id="3" name="세로 텍스트 개체 틀 2">
             <a:extLst>
               <a:ext uri="{FF2B5EF4-FFF2-40B4-BE49-F238E27FC236}">
-                <a16:creationId xmlns:a16="http://schemas.microsoft.com/office/drawing/2014/main" id="{0B89620B-4455-4865-8009-F4B846601F06}"/>
+                <a16:creationId xmlns="" xmlns:a16="http://schemas.microsoft.com/office/drawing/2014/main" id="{0B89620B-4455-4865-8009-F4B846601F06}"/>
               </a:ext>
             </a:extLst>
           </p:cNvPr>
@@ -434,7 +435,7 @@
           <p:cNvPr id="4" name="날짜 개체 틀 3">
             <a:extLst>
               <a:ext uri="{FF2B5EF4-FFF2-40B4-BE49-F238E27FC236}">
-                <a16:creationId xmlns:a16="http://schemas.microsoft.com/office/drawing/2014/main" id="{CB602D2B-3FA4-49D3-B31B-C23185837909}"/>
+                <a16:creationId xmlns="" xmlns:a16="http://schemas.microsoft.com/office/drawing/2014/main" id="{CB602D2B-3FA4-49D3-B31B-C23185837909}"/>
               </a:ext>
             </a:extLst>
           </p:cNvPr>
@@ -452,7 +453,7 @@
           <a:p>
             <a:fld id="{534DC4C4-D2E4-46DD-99F3-0C8D8B74BDF6}" type="datetimeFigureOut">
               <a:rPr lang="ko-KR" altLang="en-US" smtClean="0"/>
-              <a:t>2020-09-12</a:t>
+              <a:t>2020-09-14</a:t>
             </a:fld>
             <a:endParaRPr lang="ko-KR" altLang="en-US"/>
           </a:p>
@@ -463,7 +464,7 @@
           <p:cNvPr id="5" name="바닥글 개체 틀 4">
             <a:extLst>
               <a:ext uri="{FF2B5EF4-FFF2-40B4-BE49-F238E27FC236}">
-                <a16:creationId xmlns:a16="http://schemas.microsoft.com/office/drawing/2014/main" id="{601AA8FE-B2E1-41CC-A851-18025A6006F7}"/>
+                <a16:creationId xmlns="" xmlns:a16="http://schemas.microsoft.com/office/drawing/2014/main" id="{601AA8FE-B2E1-41CC-A851-18025A6006F7}"/>
               </a:ext>
             </a:extLst>
           </p:cNvPr>
@@ -488,7 +489,7 @@
           <p:cNvPr id="6" name="슬라이드 번호 개체 틀 5">
             <a:extLst>
               <a:ext uri="{FF2B5EF4-FFF2-40B4-BE49-F238E27FC236}">
-                <a16:creationId xmlns:a16="http://schemas.microsoft.com/office/drawing/2014/main" id="{B3085F59-20D3-44ED-95A2-75916B141BA6}"/>
+                <a16:creationId xmlns="" xmlns:a16="http://schemas.microsoft.com/office/drawing/2014/main" id="{B3085F59-20D3-44ED-95A2-75916B141BA6}"/>
               </a:ext>
             </a:extLst>
           </p:cNvPr>
@@ -547,7 +548,7 @@
           <p:cNvPr id="2" name="세로 제목 1">
             <a:extLst>
               <a:ext uri="{FF2B5EF4-FFF2-40B4-BE49-F238E27FC236}">
-                <a16:creationId xmlns:a16="http://schemas.microsoft.com/office/drawing/2014/main" id="{87A0A62A-AC47-40AE-8F98-700D5C66D9D4}"/>
+                <a16:creationId xmlns="" xmlns:a16="http://schemas.microsoft.com/office/drawing/2014/main" id="{87A0A62A-AC47-40AE-8F98-700D5C66D9D4}"/>
               </a:ext>
             </a:extLst>
           </p:cNvPr>
@@ -580,7 +581,7 @@
           <p:cNvPr id="3" name="세로 텍스트 개체 틀 2">
             <a:extLst>
               <a:ext uri="{FF2B5EF4-FFF2-40B4-BE49-F238E27FC236}">
-                <a16:creationId xmlns:a16="http://schemas.microsoft.com/office/drawing/2014/main" id="{21F3576F-965B-4E73-ABA7-BB8CCBC4CC0D}"/>
+                <a16:creationId xmlns="" xmlns:a16="http://schemas.microsoft.com/office/drawing/2014/main" id="{21F3576F-965B-4E73-ABA7-BB8CCBC4CC0D}"/>
               </a:ext>
             </a:extLst>
           </p:cNvPr>
@@ -642,7 +643,7 @@
           <p:cNvPr id="4" name="날짜 개체 틀 3">
             <a:extLst>
               <a:ext uri="{FF2B5EF4-FFF2-40B4-BE49-F238E27FC236}">
-                <a16:creationId xmlns:a16="http://schemas.microsoft.com/office/drawing/2014/main" id="{2FBD4506-0230-43EC-AE6A-678693E8F60D}"/>
+                <a16:creationId xmlns="" xmlns:a16="http://schemas.microsoft.com/office/drawing/2014/main" id="{2FBD4506-0230-43EC-AE6A-678693E8F60D}"/>
               </a:ext>
             </a:extLst>
           </p:cNvPr>
@@ -660,7 +661,7 @@
           <a:p>
             <a:fld id="{534DC4C4-D2E4-46DD-99F3-0C8D8B74BDF6}" type="datetimeFigureOut">
               <a:rPr lang="ko-KR" altLang="en-US" smtClean="0"/>
-              <a:t>2020-09-12</a:t>
+              <a:t>2020-09-14</a:t>
             </a:fld>
             <a:endParaRPr lang="ko-KR" altLang="en-US"/>
           </a:p>
@@ -671,7 +672,7 @@
           <p:cNvPr id="5" name="바닥글 개체 틀 4">
             <a:extLst>
               <a:ext uri="{FF2B5EF4-FFF2-40B4-BE49-F238E27FC236}">
-                <a16:creationId xmlns:a16="http://schemas.microsoft.com/office/drawing/2014/main" id="{840E6358-B3A8-4A4E-A761-7870062B3983}"/>
+                <a16:creationId xmlns="" xmlns:a16="http://schemas.microsoft.com/office/drawing/2014/main" id="{840E6358-B3A8-4A4E-A761-7870062B3983}"/>
               </a:ext>
             </a:extLst>
           </p:cNvPr>
@@ -696,7 +697,7 @@
           <p:cNvPr id="6" name="슬라이드 번호 개체 틀 5">
             <a:extLst>
               <a:ext uri="{FF2B5EF4-FFF2-40B4-BE49-F238E27FC236}">
-                <a16:creationId xmlns:a16="http://schemas.microsoft.com/office/drawing/2014/main" id="{378DA809-4AA4-4D7B-9CB5-3C1C00F01072}"/>
+                <a16:creationId xmlns="" xmlns:a16="http://schemas.microsoft.com/office/drawing/2014/main" id="{378DA809-4AA4-4D7B-9CB5-3C1C00F01072}"/>
               </a:ext>
             </a:extLst>
           </p:cNvPr>
@@ -755,7 +756,7 @@
           <p:cNvPr id="2" name="제목 1">
             <a:extLst>
               <a:ext uri="{FF2B5EF4-FFF2-40B4-BE49-F238E27FC236}">
-                <a16:creationId xmlns:a16="http://schemas.microsoft.com/office/drawing/2014/main" id="{898FC859-D824-41FA-9BED-A7A0964502F2}"/>
+                <a16:creationId xmlns="" xmlns:a16="http://schemas.microsoft.com/office/drawing/2014/main" id="{898FC859-D824-41FA-9BED-A7A0964502F2}"/>
               </a:ext>
             </a:extLst>
           </p:cNvPr>
@@ -783,7 +784,7 @@
           <p:cNvPr id="3" name="내용 개체 틀 2">
             <a:extLst>
               <a:ext uri="{FF2B5EF4-FFF2-40B4-BE49-F238E27FC236}">
-                <a16:creationId xmlns:a16="http://schemas.microsoft.com/office/drawing/2014/main" id="{8814392E-0978-42F9-ACB6-6A072AB6B331}"/>
+                <a16:creationId xmlns="" xmlns:a16="http://schemas.microsoft.com/office/drawing/2014/main" id="{8814392E-0978-42F9-ACB6-6A072AB6B331}"/>
               </a:ext>
             </a:extLst>
           </p:cNvPr>
@@ -840,7 +841,7 @@
           <p:cNvPr id="4" name="날짜 개체 틀 3">
             <a:extLst>
               <a:ext uri="{FF2B5EF4-FFF2-40B4-BE49-F238E27FC236}">
-                <a16:creationId xmlns:a16="http://schemas.microsoft.com/office/drawing/2014/main" id="{EB4378AB-DAA1-4593-8261-D2C311AD1FFB}"/>
+                <a16:creationId xmlns="" xmlns:a16="http://schemas.microsoft.com/office/drawing/2014/main" id="{EB4378AB-DAA1-4593-8261-D2C311AD1FFB}"/>
               </a:ext>
             </a:extLst>
           </p:cNvPr>
@@ -858,7 +859,7 @@
           <a:p>
             <a:fld id="{534DC4C4-D2E4-46DD-99F3-0C8D8B74BDF6}" type="datetimeFigureOut">
               <a:rPr lang="ko-KR" altLang="en-US" smtClean="0"/>
-              <a:t>2020-09-12</a:t>
+              <a:t>2020-09-14</a:t>
             </a:fld>
             <a:endParaRPr lang="ko-KR" altLang="en-US"/>
           </a:p>
@@ -869,7 +870,7 @@
           <p:cNvPr id="5" name="바닥글 개체 틀 4">
             <a:extLst>
               <a:ext uri="{FF2B5EF4-FFF2-40B4-BE49-F238E27FC236}">
-                <a16:creationId xmlns:a16="http://schemas.microsoft.com/office/drawing/2014/main" id="{AA71EB67-942D-4321-95C8-306AB706840C}"/>
+                <a16:creationId xmlns="" xmlns:a16="http://schemas.microsoft.com/office/drawing/2014/main" id="{AA71EB67-942D-4321-95C8-306AB706840C}"/>
               </a:ext>
             </a:extLst>
           </p:cNvPr>
@@ -894,7 +895,7 @@
           <p:cNvPr id="6" name="슬라이드 번호 개체 틀 5">
             <a:extLst>
               <a:ext uri="{FF2B5EF4-FFF2-40B4-BE49-F238E27FC236}">
-                <a16:creationId xmlns:a16="http://schemas.microsoft.com/office/drawing/2014/main" id="{A0E9B250-58CE-4972-B66F-7563EEC264D3}"/>
+                <a16:creationId xmlns="" xmlns:a16="http://schemas.microsoft.com/office/drawing/2014/main" id="{A0E9B250-58CE-4972-B66F-7563EEC264D3}"/>
               </a:ext>
             </a:extLst>
           </p:cNvPr>
@@ -953,7 +954,7 @@
           <p:cNvPr id="2" name="제목 1">
             <a:extLst>
               <a:ext uri="{FF2B5EF4-FFF2-40B4-BE49-F238E27FC236}">
-                <a16:creationId xmlns:a16="http://schemas.microsoft.com/office/drawing/2014/main" id="{5B573D1C-3DA0-4836-B3AB-FCCA25E08C68}"/>
+                <a16:creationId xmlns="" xmlns:a16="http://schemas.microsoft.com/office/drawing/2014/main" id="{5B573D1C-3DA0-4836-B3AB-FCCA25E08C68}"/>
               </a:ext>
             </a:extLst>
           </p:cNvPr>
@@ -990,7 +991,7 @@
           <p:cNvPr id="3" name="텍스트 개체 틀 2">
             <a:extLst>
               <a:ext uri="{FF2B5EF4-FFF2-40B4-BE49-F238E27FC236}">
-                <a16:creationId xmlns:a16="http://schemas.microsoft.com/office/drawing/2014/main" id="{E20AC22A-EBD5-4E74-89D7-CA592783674F}"/>
+                <a16:creationId xmlns="" xmlns:a16="http://schemas.microsoft.com/office/drawing/2014/main" id="{E20AC22A-EBD5-4E74-89D7-CA592783674F}"/>
               </a:ext>
             </a:extLst>
           </p:cNvPr>
@@ -1115,7 +1116,7 @@
           <p:cNvPr id="4" name="날짜 개체 틀 3">
             <a:extLst>
               <a:ext uri="{FF2B5EF4-FFF2-40B4-BE49-F238E27FC236}">
-                <a16:creationId xmlns:a16="http://schemas.microsoft.com/office/drawing/2014/main" id="{7164B304-5962-4DA6-B160-B540AC8AA0BB}"/>
+                <a16:creationId xmlns="" xmlns:a16="http://schemas.microsoft.com/office/drawing/2014/main" id="{7164B304-5962-4DA6-B160-B540AC8AA0BB}"/>
               </a:ext>
             </a:extLst>
           </p:cNvPr>
@@ -1133,7 +1134,7 @@
           <a:p>
             <a:fld id="{534DC4C4-D2E4-46DD-99F3-0C8D8B74BDF6}" type="datetimeFigureOut">
               <a:rPr lang="ko-KR" altLang="en-US" smtClean="0"/>
-              <a:t>2020-09-12</a:t>
+              <a:t>2020-09-14</a:t>
             </a:fld>
             <a:endParaRPr lang="ko-KR" altLang="en-US"/>
           </a:p>
@@ -1144,7 +1145,7 @@
           <p:cNvPr id="5" name="바닥글 개체 틀 4">
             <a:extLst>
               <a:ext uri="{FF2B5EF4-FFF2-40B4-BE49-F238E27FC236}">
-                <a16:creationId xmlns:a16="http://schemas.microsoft.com/office/drawing/2014/main" id="{4E50999C-21C6-447B-9E87-741EEAF071A3}"/>
+                <a16:creationId xmlns="" xmlns:a16="http://schemas.microsoft.com/office/drawing/2014/main" id="{4E50999C-21C6-447B-9E87-741EEAF071A3}"/>
               </a:ext>
             </a:extLst>
           </p:cNvPr>
@@ -1169,7 +1170,7 @@
           <p:cNvPr id="6" name="슬라이드 번호 개체 틀 5">
             <a:extLst>
               <a:ext uri="{FF2B5EF4-FFF2-40B4-BE49-F238E27FC236}">
-                <a16:creationId xmlns:a16="http://schemas.microsoft.com/office/drawing/2014/main" id="{8A73967C-2842-430D-AB03-EEF60102FAD4}"/>
+                <a16:creationId xmlns="" xmlns:a16="http://schemas.microsoft.com/office/drawing/2014/main" id="{8A73967C-2842-430D-AB03-EEF60102FAD4}"/>
               </a:ext>
             </a:extLst>
           </p:cNvPr>
@@ -1228,7 +1229,7 @@
           <p:cNvPr id="2" name="제목 1">
             <a:extLst>
               <a:ext uri="{FF2B5EF4-FFF2-40B4-BE49-F238E27FC236}">
-                <a16:creationId xmlns:a16="http://schemas.microsoft.com/office/drawing/2014/main" id="{5B861456-6233-44C1-A663-2AAE0B4EE0DD}"/>
+                <a16:creationId xmlns="" xmlns:a16="http://schemas.microsoft.com/office/drawing/2014/main" id="{5B861456-6233-44C1-A663-2AAE0B4EE0DD}"/>
               </a:ext>
             </a:extLst>
           </p:cNvPr>
@@ -1256,7 +1257,7 @@
           <p:cNvPr id="3" name="내용 개체 틀 2">
             <a:extLst>
               <a:ext uri="{FF2B5EF4-FFF2-40B4-BE49-F238E27FC236}">
-                <a16:creationId xmlns:a16="http://schemas.microsoft.com/office/drawing/2014/main" id="{99901474-CC92-4620-91A8-1D4E6B2C6A14}"/>
+                <a16:creationId xmlns="" xmlns:a16="http://schemas.microsoft.com/office/drawing/2014/main" id="{99901474-CC92-4620-91A8-1D4E6B2C6A14}"/>
               </a:ext>
             </a:extLst>
           </p:cNvPr>
@@ -1318,7 +1319,7 @@
           <p:cNvPr id="4" name="내용 개체 틀 3">
             <a:extLst>
               <a:ext uri="{FF2B5EF4-FFF2-40B4-BE49-F238E27FC236}">
-                <a16:creationId xmlns:a16="http://schemas.microsoft.com/office/drawing/2014/main" id="{41EDCAE4-F717-46B0-9E36-75C18B4E6B05}"/>
+                <a16:creationId xmlns="" xmlns:a16="http://schemas.microsoft.com/office/drawing/2014/main" id="{41EDCAE4-F717-46B0-9E36-75C18B4E6B05}"/>
               </a:ext>
             </a:extLst>
           </p:cNvPr>
@@ -1380,7 +1381,7 @@
           <p:cNvPr id="5" name="날짜 개체 틀 4">
             <a:extLst>
               <a:ext uri="{FF2B5EF4-FFF2-40B4-BE49-F238E27FC236}">
-                <a16:creationId xmlns:a16="http://schemas.microsoft.com/office/drawing/2014/main" id="{0DB94C57-6577-45A5-BA5F-DE909D32D6AC}"/>
+                <a16:creationId xmlns="" xmlns:a16="http://schemas.microsoft.com/office/drawing/2014/main" id="{0DB94C57-6577-45A5-BA5F-DE909D32D6AC}"/>
               </a:ext>
             </a:extLst>
           </p:cNvPr>
@@ -1398,7 +1399,7 @@
           <a:p>
             <a:fld id="{534DC4C4-D2E4-46DD-99F3-0C8D8B74BDF6}" type="datetimeFigureOut">
               <a:rPr lang="ko-KR" altLang="en-US" smtClean="0"/>
-              <a:t>2020-09-12</a:t>
+              <a:t>2020-09-14</a:t>
             </a:fld>
             <a:endParaRPr lang="ko-KR" altLang="en-US"/>
           </a:p>
@@ -1409,7 +1410,7 @@
           <p:cNvPr id="6" name="바닥글 개체 틀 5">
             <a:extLst>
               <a:ext uri="{FF2B5EF4-FFF2-40B4-BE49-F238E27FC236}">
-                <a16:creationId xmlns:a16="http://schemas.microsoft.com/office/drawing/2014/main" id="{377FF74B-6BFB-423B-8F8C-D850E56A4EEA}"/>
+                <a16:creationId xmlns="" xmlns:a16="http://schemas.microsoft.com/office/drawing/2014/main" id="{377FF74B-6BFB-423B-8F8C-D850E56A4EEA}"/>
               </a:ext>
             </a:extLst>
           </p:cNvPr>
@@ -1434,7 +1435,7 @@
           <p:cNvPr id="7" name="슬라이드 번호 개체 틀 6">
             <a:extLst>
               <a:ext uri="{FF2B5EF4-FFF2-40B4-BE49-F238E27FC236}">
-                <a16:creationId xmlns:a16="http://schemas.microsoft.com/office/drawing/2014/main" id="{ED2FB0BF-37D6-46C1-8EF4-5D1E9DD3FB60}"/>
+                <a16:creationId xmlns="" xmlns:a16="http://schemas.microsoft.com/office/drawing/2014/main" id="{ED2FB0BF-37D6-46C1-8EF4-5D1E9DD3FB60}"/>
               </a:ext>
             </a:extLst>
           </p:cNvPr>
@@ -1493,7 +1494,7 @@
           <p:cNvPr id="2" name="제목 1">
             <a:extLst>
               <a:ext uri="{FF2B5EF4-FFF2-40B4-BE49-F238E27FC236}">
-                <a16:creationId xmlns:a16="http://schemas.microsoft.com/office/drawing/2014/main" id="{53FCEFCA-80BF-4F8D-A359-569014C0D208}"/>
+                <a16:creationId xmlns="" xmlns:a16="http://schemas.microsoft.com/office/drawing/2014/main" id="{53FCEFCA-80BF-4F8D-A359-569014C0D208}"/>
               </a:ext>
             </a:extLst>
           </p:cNvPr>
@@ -1526,7 +1527,7 @@
           <p:cNvPr id="3" name="텍스트 개체 틀 2">
             <a:extLst>
               <a:ext uri="{FF2B5EF4-FFF2-40B4-BE49-F238E27FC236}">
-                <a16:creationId xmlns:a16="http://schemas.microsoft.com/office/drawing/2014/main" id="{CA32F2BE-C584-47B3-859D-68CA22C7F90A}"/>
+                <a16:creationId xmlns="" xmlns:a16="http://schemas.microsoft.com/office/drawing/2014/main" id="{CA32F2BE-C584-47B3-859D-68CA22C7F90A}"/>
               </a:ext>
             </a:extLst>
           </p:cNvPr>
@@ -1597,7 +1598,7 @@
           <p:cNvPr id="4" name="내용 개체 틀 3">
             <a:extLst>
               <a:ext uri="{FF2B5EF4-FFF2-40B4-BE49-F238E27FC236}">
-                <a16:creationId xmlns:a16="http://schemas.microsoft.com/office/drawing/2014/main" id="{8FA56CCC-32FA-47C6-96BE-00A006E7D9AE}"/>
+                <a16:creationId xmlns="" xmlns:a16="http://schemas.microsoft.com/office/drawing/2014/main" id="{8FA56CCC-32FA-47C6-96BE-00A006E7D9AE}"/>
               </a:ext>
             </a:extLst>
           </p:cNvPr>
@@ -1659,7 +1660,7 @@
           <p:cNvPr id="5" name="텍스트 개체 틀 4">
             <a:extLst>
               <a:ext uri="{FF2B5EF4-FFF2-40B4-BE49-F238E27FC236}">
-                <a16:creationId xmlns:a16="http://schemas.microsoft.com/office/drawing/2014/main" id="{59815552-0D7B-4A62-965D-8A81EB101434}"/>
+                <a16:creationId xmlns="" xmlns:a16="http://schemas.microsoft.com/office/drawing/2014/main" id="{59815552-0D7B-4A62-965D-8A81EB101434}"/>
               </a:ext>
             </a:extLst>
           </p:cNvPr>
@@ -1730,7 +1731,7 @@
           <p:cNvPr id="6" name="내용 개체 틀 5">
             <a:extLst>
               <a:ext uri="{FF2B5EF4-FFF2-40B4-BE49-F238E27FC236}">
-                <a16:creationId xmlns:a16="http://schemas.microsoft.com/office/drawing/2014/main" id="{A38936C4-A13B-4E4E-B803-40E1109EE83B}"/>
+                <a16:creationId xmlns="" xmlns:a16="http://schemas.microsoft.com/office/drawing/2014/main" id="{A38936C4-A13B-4E4E-B803-40E1109EE83B}"/>
               </a:ext>
             </a:extLst>
           </p:cNvPr>
@@ -1792,7 +1793,7 @@
           <p:cNvPr id="7" name="날짜 개체 틀 6">
             <a:extLst>
               <a:ext uri="{FF2B5EF4-FFF2-40B4-BE49-F238E27FC236}">
-                <a16:creationId xmlns:a16="http://schemas.microsoft.com/office/drawing/2014/main" id="{6351E46B-DD70-4F35-A8D1-C9D470A28488}"/>
+                <a16:creationId xmlns="" xmlns:a16="http://schemas.microsoft.com/office/drawing/2014/main" id="{6351E46B-DD70-4F35-A8D1-C9D470A28488}"/>
               </a:ext>
             </a:extLst>
           </p:cNvPr>
@@ -1810,7 +1811,7 @@
           <a:p>
             <a:fld id="{534DC4C4-D2E4-46DD-99F3-0C8D8B74BDF6}" type="datetimeFigureOut">
               <a:rPr lang="ko-KR" altLang="en-US" smtClean="0"/>
-              <a:t>2020-09-12</a:t>
+              <a:t>2020-09-14</a:t>
             </a:fld>
             <a:endParaRPr lang="ko-KR" altLang="en-US"/>
           </a:p>
@@ -1821,7 +1822,7 @@
           <p:cNvPr id="8" name="바닥글 개체 틀 7">
             <a:extLst>
               <a:ext uri="{FF2B5EF4-FFF2-40B4-BE49-F238E27FC236}">
-                <a16:creationId xmlns:a16="http://schemas.microsoft.com/office/drawing/2014/main" id="{FCC9E428-2F7C-4857-BA58-21A2BD89011B}"/>
+                <a16:creationId xmlns="" xmlns:a16="http://schemas.microsoft.com/office/drawing/2014/main" id="{FCC9E428-2F7C-4857-BA58-21A2BD89011B}"/>
               </a:ext>
             </a:extLst>
           </p:cNvPr>
@@ -1846,7 +1847,7 @@
           <p:cNvPr id="9" name="슬라이드 번호 개체 틀 8">
             <a:extLst>
               <a:ext uri="{FF2B5EF4-FFF2-40B4-BE49-F238E27FC236}">
-                <a16:creationId xmlns:a16="http://schemas.microsoft.com/office/drawing/2014/main" id="{804DDD9E-6A73-4CE3-9881-C0F39D34AA7F}"/>
+                <a16:creationId xmlns="" xmlns:a16="http://schemas.microsoft.com/office/drawing/2014/main" id="{804DDD9E-6A73-4CE3-9881-C0F39D34AA7F}"/>
               </a:ext>
             </a:extLst>
           </p:cNvPr>
@@ -1905,7 +1906,7 @@
           <p:cNvPr id="2" name="제목 1">
             <a:extLst>
               <a:ext uri="{FF2B5EF4-FFF2-40B4-BE49-F238E27FC236}">
-                <a16:creationId xmlns:a16="http://schemas.microsoft.com/office/drawing/2014/main" id="{544517B2-0057-4CA3-8825-D5683C4BFBC9}"/>
+                <a16:creationId xmlns="" xmlns:a16="http://schemas.microsoft.com/office/drawing/2014/main" id="{544517B2-0057-4CA3-8825-D5683C4BFBC9}"/>
               </a:ext>
             </a:extLst>
           </p:cNvPr>
@@ -1933,7 +1934,7 @@
           <p:cNvPr id="3" name="날짜 개체 틀 2">
             <a:extLst>
               <a:ext uri="{FF2B5EF4-FFF2-40B4-BE49-F238E27FC236}">
-                <a16:creationId xmlns:a16="http://schemas.microsoft.com/office/drawing/2014/main" id="{9D51AF66-7DEA-4208-9D73-6BF24B42D6BF}"/>
+                <a16:creationId xmlns="" xmlns:a16="http://schemas.microsoft.com/office/drawing/2014/main" id="{9D51AF66-7DEA-4208-9D73-6BF24B42D6BF}"/>
               </a:ext>
             </a:extLst>
           </p:cNvPr>
@@ -1951,7 +1952,7 @@
           <a:p>
             <a:fld id="{534DC4C4-D2E4-46DD-99F3-0C8D8B74BDF6}" type="datetimeFigureOut">
               <a:rPr lang="ko-KR" altLang="en-US" smtClean="0"/>
-              <a:t>2020-09-12</a:t>
+              <a:t>2020-09-14</a:t>
             </a:fld>
             <a:endParaRPr lang="ko-KR" altLang="en-US"/>
           </a:p>
@@ -1962,7 +1963,7 @@
           <p:cNvPr id="4" name="바닥글 개체 틀 3">
             <a:extLst>
               <a:ext uri="{FF2B5EF4-FFF2-40B4-BE49-F238E27FC236}">
-                <a16:creationId xmlns:a16="http://schemas.microsoft.com/office/drawing/2014/main" id="{75541530-E472-42D7-ABE3-93E3E2B72E3A}"/>
+                <a16:creationId xmlns="" xmlns:a16="http://schemas.microsoft.com/office/drawing/2014/main" id="{75541530-E472-42D7-ABE3-93E3E2B72E3A}"/>
               </a:ext>
             </a:extLst>
           </p:cNvPr>
@@ -1987,7 +1988,7 @@
           <p:cNvPr id="5" name="슬라이드 번호 개체 틀 4">
             <a:extLst>
               <a:ext uri="{FF2B5EF4-FFF2-40B4-BE49-F238E27FC236}">
-                <a16:creationId xmlns:a16="http://schemas.microsoft.com/office/drawing/2014/main" id="{8EFFB5DE-3267-49C0-AB6C-6F5B43550C03}"/>
+                <a16:creationId xmlns="" xmlns:a16="http://schemas.microsoft.com/office/drawing/2014/main" id="{8EFFB5DE-3267-49C0-AB6C-6F5B43550C03}"/>
               </a:ext>
             </a:extLst>
           </p:cNvPr>
@@ -2046,7 +2047,7 @@
           <p:cNvPr id="2" name="날짜 개체 틀 1">
             <a:extLst>
               <a:ext uri="{FF2B5EF4-FFF2-40B4-BE49-F238E27FC236}">
-                <a16:creationId xmlns:a16="http://schemas.microsoft.com/office/drawing/2014/main" id="{35016A49-BC42-4791-9B44-46E28BEB15C9}"/>
+                <a16:creationId xmlns="" xmlns:a16="http://schemas.microsoft.com/office/drawing/2014/main" id="{35016A49-BC42-4791-9B44-46E28BEB15C9}"/>
               </a:ext>
             </a:extLst>
           </p:cNvPr>
@@ -2064,7 +2065,7 @@
           <a:p>
             <a:fld id="{534DC4C4-D2E4-46DD-99F3-0C8D8B74BDF6}" type="datetimeFigureOut">
               <a:rPr lang="ko-KR" altLang="en-US" smtClean="0"/>
-              <a:t>2020-09-12</a:t>
+              <a:t>2020-09-14</a:t>
             </a:fld>
             <a:endParaRPr lang="ko-KR" altLang="en-US"/>
           </a:p>
@@ -2075,7 +2076,7 @@
           <p:cNvPr id="3" name="바닥글 개체 틀 2">
             <a:extLst>
               <a:ext uri="{FF2B5EF4-FFF2-40B4-BE49-F238E27FC236}">
-                <a16:creationId xmlns:a16="http://schemas.microsoft.com/office/drawing/2014/main" id="{F458053C-9088-44EA-B7A8-11DDCBE83E04}"/>
+                <a16:creationId xmlns="" xmlns:a16="http://schemas.microsoft.com/office/drawing/2014/main" id="{F458053C-9088-44EA-B7A8-11DDCBE83E04}"/>
               </a:ext>
             </a:extLst>
           </p:cNvPr>
@@ -2100,7 +2101,7 @@
           <p:cNvPr id="4" name="슬라이드 번호 개체 틀 3">
             <a:extLst>
               <a:ext uri="{FF2B5EF4-FFF2-40B4-BE49-F238E27FC236}">
-                <a16:creationId xmlns:a16="http://schemas.microsoft.com/office/drawing/2014/main" id="{5C08E463-DFDA-421C-940D-636F3798E74F}"/>
+                <a16:creationId xmlns="" xmlns:a16="http://schemas.microsoft.com/office/drawing/2014/main" id="{5C08E463-DFDA-421C-940D-636F3798E74F}"/>
               </a:ext>
             </a:extLst>
           </p:cNvPr>
@@ -2159,7 +2160,7 @@
           <p:cNvPr id="2" name="제목 1">
             <a:extLst>
               <a:ext uri="{FF2B5EF4-FFF2-40B4-BE49-F238E27FC236}">
-                <a16:creationId xmlns:a16="http://schemas.microsoft.com/office/drawing/2014/main" id="{19293FDB-79BC-45C0-A910-36A7EE282D51}"/>
+                <a16:creationId xmlns="" xmlns:a16="http://schemas.microsoft.com/office/drawing/2014/main" id="{19293FDB-79BC-45C0-A910-36A7EE282D51}"/>
               </a:ext>
             </a:extLst>
           </p:cNvPr>
@@ -2196,7 +2197,7 @@
           <p:cNvPr id="3" name="내용 개체 틀 2">
             <a:extLst>
               <a:ext uri="{FF2B5EF4-FFF2-40B4-BE49-F238E27FC236}">
-                <a16:creationId xmlns:a16="http://schemas.microsoft.com/office/drawing/2014/main" id="{DC621DD0-5413-4A60-B5F4-E58B2C3ACA8F}"/>
+                <a16:creationId xmlns="" xmlns:a16="http://schemas.microsoft.com/office/drawing/2014/main" id="{DC621DD0-5413-4A60-B5F4-E58B2C3ACA8F}"/>
               </a:ext>
             </a:extLst>
           </p:cNvPr>
@@ -2286,7 +2287,7 @@
           <p:cNvPr id="4" name="텍스트 개체 틀 3">
             <a:extLst>
               <a:ext uri="{FF2B5EF4-FFF2-40B4-BE49-F238E27FC236}">
-                <a16:creationId xmlns:a16="http://schemas.microsoft.com/office/drawing/2014/main" id="{885CB5AB-43C3-4EF8-8365-B9061FCE2873}"/>
+                <a16:creationId xmlns="" xmlns:a16="http://schemas.microsoft.com/office/drawing/2014/main" id="{885CB5AB-43C3-4EF8-8365-B9061FCE2873}"/>
               </a:ext>
             </a:extLst>
           </p:cNvPr>
@@ -2357,7 +2358,7 @@
           <p:cNvPr id="5" name="날짜 개체 틀 4">
             <a:extLst>
               <a:ext uri="{FF2B5EF4-FFF2-40B4-BE49-F238E27FC236}">
-                <a16:creationId xmlns:a16="http://schemas.microsoft.com/office/drawing/2014/main" id="{2EDB0883-3DAD-40E8-BC73-783B2CAC8795}"/>
+                <a16:creationId xmlns="" xmlns:a16="http://schemas.microsoft.com/office/drawing/2014/main" id="{2EDB0883-3DAD-40E8-BC73-783B2CAC8795}"/>
               </a:ext>
             </a:extLst>
           </p:cNvPr>
@@ -2375,7 +2376,7 @@
           <a:p>
             <a:fld id="{534DC4C4-D2E4-46DD-99F3-0C8D8B74BDF6}" type="datetimeFigureOut">
               <a:rPr lang="ko-KR" altLang="en-US" smtClean="0"/>
-              <a:t>2020-09-12</a:t>
+              <a:t>2020-09-14</a:t>
             </a:fld>
             <a:endParaRPr lang="ko-KR" altLang="en-US"/>
           </a:p>
@@ -2386,7 +2387,7 @@
           <p:cNvPr id="6" name="바닥글 개체 틀 5">
             <a:extLst>
               <a:ext uri="{FF2B5EF4-FFF2-40B4-BE49-F238E27FC236}">
-                <a16:creationId xmlns:a16="http://schemas.microsoft.com/office/drawing/2014/main" id="{B66C443D-DD76-47A9-B14A-E6D1E5CAA793}"/>
+                <a16:creationId xmlns="" xmlns:a16="http://schemas.microsoft.com/office/drawing/2014/main" id="{B66C443D-DD76-47A9-B14A-E6D1E5CAA793}"/>
               </a:ext>
             </a:extLst>
           </p:cNvPr>
@@ -2411,7 +2412,7 @@
           <p:cNvPr id="7" name="슬라이드 번호 개체 틀 6">
             <a:extLst>
               <a:ext uri="{FF2B5EF4-FFF2-40B4-BE49-F238E27FC236}">
-                <a16:creationId xmlns:a16="http://schemas.microsoft.com/office/drawing/2014/main" id="{F293C926-19B4-487A-B623-A37E2D26D2CB}"/>
+                <a16:creationId xmlns="" xmlns:a16="http://schemas.microsoft.com/office/drawing/2014/main" id="{F293C926-19B4-487A-B623-A37E2D26D2CB}"/>
               </a:ext>
             </a:extLst>
           </p:cNvPr>
@@ -2470,7 +2471,7 @@
           <p:cNvPr id="2" name="제목 1">
             <a:extLst>
               <a:ext uri="{FF2B5EF4-FFF2-40B4-BE49-F238E27FC236}">
-                <a16:creationId xmlns:a16="http://schemas.microsoft.com/office/drawing/2014/main" id="{A46A2694-B24D-4925-900E-101247D8E0EB}"/>
+                <a16:creationId xmlns="" xmlns:a16="http://schemas.microsoft.com/office/drawing/2014/main" id="{A46A2694-B24D-4925-900E-101247D8E0EB}"/>
               </a:ext>
             </a:extLst>
           </p:cNvPr>
@@ -2507,7 +2508,7 @@
           <p:cNvPr id="3" name="그림 개체 틀 2">
             <a:extLst>
               <a:ext uri="{FF2B5EF4-FFF2-40B4-BE49-F238E27FC236}">
-                <a16:creationId xmlns:a16="http://schemas.microsoft.com/office/drawing/2014/main" id="{69400D94-8B07-4275-9670-272DD8104F7E}"/>
+                <a16:creationId xmlns="" xmlns:a16="http://schemas.microsoft.com/office/drawing/2014/main" id="{69400D94-8B07-4275-9670-272DD8104F7E}"/>
               </a:ext>
             </a:extLst>
           </p:cNvPr>
@@ -2574,7 +2575,7 @@
           <p:cNvPr id="4" name="텍스트 개체 틀 3">
             <a:extLst>
               <a:ext uri="{FF2B5EF4-FFF2-40B4-BE49-F238E27FC236}">
-                <a16:creationId xmlns:a16="http://schemas.microsoft.com/office/drawing/2014/main" id="{CBF26D36-B450-48EF-8D94-C7E563868F7E}"/>
+                <a16:creationId xmlns="" xmlns:a16="http://schemas.microsoft.com/office/drawing/2014/main" id="{CBF26D36-B450-48EF-8D94-C7E563868F7E}"/>
               </a:ext>
             </a:extLst>
           </p:cNvPr>
@@ -2645,7 +2646,7 @@
           <p:cNvPr id="5" name="날짜 개체 틀 4">
             <a:extLst>
               <a:ext uri="{FF2B5EF4-FFF2-40B4-BE49-F238E27FC236}">
-                <a16:creationId xmlns:a16="http://schemas.microsoft.com/office/drawing/2014/main" id="{0CDB203F-8161-4DBC-8FB1-E91C25AAEDE2}"/>
+                <a16:creationId xmlns="" xmlns:a16="http://schemas.microsoft.com/office/drawing/2014/main" id="{0CDB203F-8161-4DBC-8FB1-E91C25AAEDE2}"/>
               </a:ext>
             </a:extLst>
           </p:cNvPr>
@@ -2663,7 +2664,7 @@
           <a:p>
             <a:fld id="{534DC4C4-D2E4-46DD-99F3-0C8D8B74BDF6}" type="datetimeFigureOut">
               <a:rPr lang="ko-KR" altLang="en-US" smtClean="0"/>
-              <a:t>2020-09-12</a:t>
+              <a:t>2020-09-14</a:t>
             </a:fld>
             <a:endParaRPr lang="ko-KR" altLang="en-US"/>
           </a:p>
@@ -2674,7 +2675,7 @@
           <p:cNvPr id="6" name="바닥글 개체 틀 5">
             <a:extLst>
               <a:ext uri="{FF2B5EF4-FFF2-40B4-BE49-F238E27FC236}">
-                <a16:creationId xmlns:a16="http://schemas.microsoft.com/office/drawing/2014/main" id="{12A6AF25-79BF-45AD-92A7-63C177D68446}"/>
+                <a16:creationId xmlns="" xmlns:a16="http://schemas.microsoft.com/office/drawing/2014/main" id="{12A6AF25-79BF-45AD-92A7-63C177D68446}"/>
               </a:ext>
             </a:extLst>
           </p:cNvPr>
@@ -2699,7 +2700,7 @@
           <p:cNvPr id="7" name="슬라이드 번호 개체 틀 6">
             <a:extLst>
               <a:ext uri="{FF2B5EF4-FFF2-40B4-BE49-F238E27FC236}">
-                <a16:creationId xmlns:a16="http://schemas.microsoft.com/office/drawing/2014/main" id="{EF0600DC-42C8-48FF-96B4-672E73C8570B}"/>
+                <a16:creationId xmlns="" xmlns:a16="http://schemas.microsoft.com/office/drawing/2014/main" id="{EF0600DC-42C8-48FF-96B4-672E73C8570B}"/>
               </a:ext>
             </a:extLst>
           </p:cNvPr>
@@ -2763,7 +2764,7 @@
           <p:cNvPr id="2" name="제목 개체 틀 1">
             <a:extLst>
               <a:ext uri="{FF2B5EF4-FFF2-40B4-BE49-F238E27FC236}">
-                <a16:creationId xmlns:a16="http://schemas.microsoft.com/office/drawing/2014/main" id="{EC487D50-032B-4958-A729-3DBE04DFA56D}"/>
+                <a16:creationId xmlns="" xmlns:a16="http://schemas.microsoft.com/office/drawing/2014/main" id="{EC487D50-032B-4958-A729-3DBE04DFA56D}"/>
               </a:ext>
             </a:extLst>
           </p:cNvPr>
@@ -2801,7 +2802,7 @@
           <p:cNvPr id="3" name="텍스트 개체 틀 2">
             <a:extLst>
               <a:ext uri="{FF2B5EF4-FFF2-40B4-BE49-F238E27FC236}">
-                <a16:creationId xmlns:a16="http://schemas.microsoft.com/office/drawing/2014/main" id="{C6915C2E-9B80-48CF-A397-A17F764397D3}"/>
+                <a16:creationId xmlns="" xmlns:a16="http://schemas.microsoft.com/office/drawing/2014/main" id="{C6915C2E-9B80-48CF-A397-A17F764397D3}"/>
               </a:ext>
             </a:extLst>
           </p:cNvPr>
@@ -2868,7 +2869,7 @@
           <p:cNvPr id="4" name="날짜 개체 틀 3">
             <a:extLst>
               <a:ext uri="{FF2B5EF4-FFF2-40B4-BE49-F238E27FC236}">
-                <a16:creationId xmlns:a16="http://schemas.microsoft.com/office/drawing/2014/main" id="{AF6A82D2-9072-4046-83B5-8526580AE8DC}"/>
+                <a16:creationId xmlns="" xmlns:a16="http://schemas.microsoft.com/office/drawing/2014/main" id="{AF6A82D2-9072-4046-83B5-8526580AE8DC}"/>
               </a:ext>
             </a:extLst>
           </p:cNvPr>
@@ -2904,7 +2905,7 @@
           <a:p>
             <a:fld id="{534DC4C4-D2E4-46DD-99F3-0C8D8B74BDF6}" type="datetimeFigureOut">
               <a:rPr lang="ko-KR" altLang="en-US" smtClean="0"/>
-              <a:t>2020-09-12</a:t>
+              <a:t>2020-09-14</a:t>
             </a:fld>
             <a:endParaRPr lang="ko-KR" altLang="en-US"/>
           </a:p>
@@ -2915,7 +2916,7 @@
           <p:cNvPr id="5" name="바닥글 개체 틀 4">
             <a:extLst>
               <a:ext uri="{FF2B5EF4-FFF2-40B4-BE49-F238E27FC236}">
-                <a16:creationId xmlns:a16="http://schemas.microsoft.com/office/drawing/2014/main" id="{6615AA6C-300B-4484-AC4D-25BC59C22377}"/>
+                <a16:creationId xmlns="" xmlns:a16="http://schemas.microsoft.com/office/drawing/2014/main" id="{6615AA6C-300B-4484-AC4D-25BC59C22377}"/>
               </a:ext>
             </a:extLst>
           </p:cNvPr>
@@ -2958,7 +2959,7 @@
           <p:cNvPr id="6" name="슬라이드 번호 개체 틀 5">
             <a:extLst>
               <a:ext uri="{FF2B5EF4-FFF2-40B4-BE49-F238E27FC236}">
-                <a16:creationId xmlns:a16="http://schemas.microsoft.com/office/drawing/2014/main" id="{5F0494A2-4B13-4E4C-A217-BA9B43819244}"/>
+                <a16:creationId xmlns="" xmlns:a16="http://schemas.microsoft.com/office/drawing/2014/main" id="{5F0494A2-4B13-4E4C-A217-BA9B43819244}"/>
               </a:ext>
             </a:extLst>
           </p:cNvPr>
@@ -3321,14 +3322,14 @@
           <a:chExt cx="0" cy="0"/>
         </a:xfrm>
       </p:grpSpPr>
-      <mc:AlternateContent xmlns:mc="http://schemas.openxmlformats.org/markup-compatibility/2006">
-        <mc:Choice xmlns:a14="http://schemas.microsoft.com/office/drawing/2010/main" Requires="a14">
+      <mc:AlternateContent xmlns:mc="http://schemas.openxmlformats.org/markup-compatibility/2006" xmlns:a14="http://schemas.microsoft.com/office/drawing/2010/main">
+        <mc:Choice Requires="a14">
           <p:sp>
             <p:nvSpPr>
               <p:cNvPr id="4" name="TextBox 3">
                 <a:extLst>
                   <a:ext uri="{FF2B5EF4-FFF2-40B4-BE49-F238E27FC236}">
-                    <a16:creationId xmlns:a16="http://schemas.microsoft.com/office/drawing/2014/main" id="{C6534958-8346-44AF-9533-932232FE0CB5}"/>
+                    <a16:creationId xmlns="" xmlns:a16="http://schemas.microsoft.com/office/drawing/2014/main" id="{C6534958-8346-44AF-9533-932232FE0CB5}"/>
                   </a:ext>
                 </a:extLst>
               </p:cNvPr>
@@ -3351,6 +3352,7 @@
               </a:bodyPr>
               <a:lstStyle/>
               <a:p>
+                <a:pPr/>
                 <a14:m>
                   <m:oMathPara xmlns:m="http://schemas.openxmlformats.org/officeDocument/2006/math">
                     <m:oMathParaPr>
@@ -3361,7 +3363,7 @@
                         <m:sSubPr>
                           <m:ctrlPr>
                             <a:rPr lang="en-US" altLang="ko-KR" sz="2800" b="0" i="1" smtClean="0">
-                              <a:latin typeface="Cambria Math" panose="02040503050406030204" pitchFamily="18" charset="0"/>
+                              <a:latin typeface="Cambria Math"/>
                             </a:rPr>
                           </m:ctrlPr>
                         </m:sSubPr>
@@ -3371,7 +3373,7 @@
                               <m:chr m:val="⃗"/>
                               <m:ctrlPr>
                                 <a:rPr lang="en-US" altLang="ko-KR" sz="2800" b="0" i="1" smtClean="0">
-                                  <a:latin typeface="Cambria Math" panose="02040503050406030204" pitchFamily="18" charset="0"/>
+                                  <a:latin typeface="Cambria Math"/>
                                 </a:rPr>
                               </m:ctrlPr>
                             </m:accPr>
@@ -3404,7 +3406,7 @@
                         <m:sSubPr>
                           <m:ctrlPr>
                             <a:rPr lang="en-US" altLang="ko-KR" sz="2800" b="0" i="1" smtClean="0">
-                              <a:latin typeface="Cambria Math" panose="02040503050406030204" pitchFamily="18" charset="0"/>
+                              <a:latin typeface="Cambria Math"/>
                             </a:rPr>
                           </m:ctrlPr>
                         </m:sSubPr>
@@ -3414,7 +3416,7 @@
                               <m:chr m:val="⃗"/>
                               <m:ctrlPr>
                                 <a:rPr lang="en-US" altLang="ko-KR" sz="2800" b="0" i="1" smtClean="0">
-                                  <a:latin typeface="Cambria Math" panose="02040503050406030204" pitchFamily="18" charset="0"/>
+                                  <a:latin typeface="Cambria Math"/>
                                 </a:rPr>
                               </m:ctrlPr>
                             </m:accPr>
@@ -3449,7 +3451,7 @@
                           <m:endChr m:val="]"/>
                           <m:ctrlPr>
                             <a:rPr lang="en-US" altLang="ko-KR" sz="2800" i="1" smtClean="0">
-                              <a:latin typeface="Cambria Math" panose="02040503050406030204" pitchFamily="18" charset="0"/>
+                              <a:latin typeface="Cambria Math"/>
                             </a:rPr>
                           </m:ctrlPr>
                         </m:dPr>
@@ -3466,7 +3468,7 @@
                               </m:mcs>
                               <m:ctrlPr>
                                 <a:rPr lang="en-US" altLang="ko-KR" sz="2800" i="1" smtClean="0">
-                                  <a:latin typeface="Cambria Math" panose="02040503050406030204" pitchFamily="18" charset="0"/>
+                                  <a:latin typeface="Cambria Math"/>
                                 </a:rPr>
                               </m:ctrlPr>
                             </m:mPr>
@@ -3500,7 +3502,7 @@
                           <m:endChr m:val="]"/>
                           <m:ctrlPr>
                             <a:rPr lang="en-US" altLang="ko-KR" sz="2800" i="1" smtClean="0">
-                              <a:latin typeface="Cambria Math" panose="02040503050406030204" pitchFamily="18" charset="0"/>
+                              <a:latin typeface="Cambria Math"/>
                             </a:rPr>
                           </m:ctrlPr>
                         </m:dPr>
@@ -3517,7 +3519,7 @@
                               </m:mcs>
                               <m:ctrlPr>
                                 <a:rPr lang="en-US" altLang="ko-KR" sz="2800" i="1" smtClean="0">
-                                  <a:latin typeface="Cambria Math" panose="02040503050406030204" pitchFamily="18" charset="0"/>
+                                  <a:latin typeface="Cambria Math"/>
                                 </a:rPr>
                               </m:ctrlPr>
                             </m:mPr>
@@ -3576,7 +3578,7 @@
             </p:txBody>
           </p:sp>
         </mc:Choice>
-        <mc:Fallback>
+        <mc:Fallback xmlns="">
           <p:sp>
             <p:nvSpPr>
               <p:cNvPr id="4" name="TextBox 3">
@@ -3626,7 +3628,7 @@
           <p:cNvPr id="6" name="직선 화살표 연결선 5">
             <a:extLst>
               <a:ext uri="{FF2B5EF4-FFF2-40B4-BE49-F238E27FC236}">
-                <a16:creationId xmlns:a16="http://schemas.microsoft.com/office/drawing/2014/main" id="{9C6D3BA9-E833-49BD-96EA-A4E9A244CC58}"/>
+                <a16:creationId xmlns="" xmlns:a16="http://schemas.microsoft.com/office/drawing/2014/main" id="{9C6D3BA9-E833-49BD-96EA-A4E9A244CC58}"/>
               </a:ext>
             </a:extLst>
           </p:cNvPr>
@@ -3637,7 +3639,7 @@
         </p:nvCxnSpPr>
         <p:spPr>
           <a:xfrm>
-            <a:off x="7553764" y="4567384"/>
+            <a:off x="7553764" y="4136679"/>
             <a:ext cx="3411462" cy="0"/>
           </a:xfrm>
           <a:prstGeom prst="straightConnector1">
@@ -3670,7 +3672,7 @@
           <p:cNvPr id="8" name="직선 화살표 연결선 7">
             <a:extLst>
               <a:ext uri="{FF2B5EF4-FFF2-40B4-BE49-F238E27FC236}">
-                <a16:creationId xmlns:a16="http://schemas.microsoft.com/office/drawing/2014/main" id="{F07912B5-A0CF-4BB8-887B-16179FE366D1}"/>
+                <a16:creationId xmlns="" xmlns:a16="http://schemas.microsoft.com/office/drawing/2014/main" id="{F07912B5-A0CF-4BB8-887B-16179FE366D1}"/>
               </a:ext>
             </a:extLst>
           </p:cNvPr>
@@ -3681,7 +3683,7 @@
         </p:nvCxnSpPr>
         <p:spPr>
           <a:xfrm flipV="1">
-            <a:off x="7553764" y="2248002"/>
+            <a:off x="7553764" y="1817297"/>
             <a:ext cx="2488359" cy="2319385"/>
           </a:xfrm>
           <a:prstGeom prst="straightConnector1">
@@ -3714,7 +3716,7 @@
           <p:cNvPr id="21" name="직선 연결선 20">
             <a:extLst>
               <a:ext uri="{FF2B5EF4-FFF2-40B4-BE49-F238E27FC236}">
-                <a16:creationId xmlns:a16="http://schemas.microsoft.com/office/drawing/2014/main" id="{711CBEB6-C118-4AB7-BC6B-D45F9FA3E448}"/>
+                <a16:creationId xmlns="" xmlns:a16="http://schemas.microsoft.com/office/drawing/2014/main" id="{711CBEB6-C118-4AB7-BC6B-D45F9FA3E448}"/>
               </a:ext>
             </a:extLst>
           </p:cNvPr>
@@ -3723,7 +3725,7 @@
         </p:nvCxnSpPr>
         <p:spPr>
           <a:xfrm>
-            <a:off x="10042124" y="2248002"/>
+            <a:off x="10042124" y="1817297"/>
             <a:ext cx="0" cy="2319382"/>
           </a:xfrm>
           <a:prstGeom prst="line">
@@ -3756,7 +3758,7 @@
           <p:cNvPr id="23" name="직선 연결선 22">
             <a:extLst>
               <a:ext uri="{FF2B5EF4-FFF2-40B4-BE49-F238E27FC236}">
-                <a16:creationId xmlns:a16="http://schemas.microsoft.com/office/drawing/2014/main" id="{F9667C63-6BB2-43BE-A55A-5CC19FF2C14E}"/>
+                <a16:creationId xmlns="" xmlns:a16="http://schemas.microsoft.com/office/drawing/2014/main" id="{F9667C63-6BB2-43BE-A55A-5CC19FF2C14E}"/>
               </a:ext>
             </a:extLst>
           </p:cNvPr>
@@ -3765,7 +3767,7 @@
         </p:nvCxnSpPr>
         <p:spPr>
           <a:xfrm>
-            <a:off x="9845911" y="4371170"/>
+            <a:off x="9845911" y="3940465"/>
             <a:ext cx="196212" cy="0"/>
           </a:xfrm>
           <a:prstGeom prst="line">
@@ -3797,7 +3799,7 @@
           <p:cNvPr id="24" name="직선 연결선 23">
             <a:extLst>
               <a:ext uri="{FF2B5EF4-FFF2-40B4-BE49-F238E27FC236}">
-                <a16:creationId xmlns:a16="http://schemas.microsoft.com/office/drawing/2014/main" id="{8B795301-7BD9-4917-8B96-E538943C7324}"/>
+                <a16:creationId xmlns="" xmlns:a16="http://schemas.microsoft.com/office/drawing/2014/main" id="{8B795301-7BD9-4917-8B96-E538943C7324}"/>
               </a:ext>
             </a:extLst>
           </p:cNvPr>
@@ -3808,7 +3810,7 @@
         </p:nvCxnSpPr>
         <p:spPr>
           <a:xfrm rot="16200000">
-            <a:off x="9750731" y="4469278"/>
+            <a:off x="9750731" y="4038573"/>
             <a:ext cx="196212" cy="0"/>
           </a:xfrm>
           <a:prstGeom prst="line">
@@ -3840,7 +3842,7 @@
           <p:cNvPr id="25" name="원호 24">
             <a:extLst>
               <a:ext uri="{FF2B5EF4-FFF2-40B4-BE49-F238E27FC236}">
-                <a16:creationId xmlns:a16="http://schemas.microsoft.com/office/drawing/2014/main" id="{84B20BB5-B2AB-4A7F-A976-6B56CEC72FC3}"/>
+                <a16:creationId xmlns="" xmlns:a16="http://schemas.microsoft.com/office/drawing/2014/main" id="{84B20BB5-B2AB-4A7F-A976-6B56CEC72FC3}"/>
               </a:ext>
             </a:extLst>
           </p:cNvPr>
@@ -3849,7 +3851,7 @@
         </p:nvSpPr>
         <p:spPr>
           <a:xfrm>
-            <a:off x="7553763" y="4203702"/>
+            <a:off x="7553763" y="3772997"/>
             <a:ext cx="559318" cy="752601"/>
           </a:xfrm>
           <a:prstGeom prst="arc">
@@ -3888,14 +3890,14 @@
           </a:p>
         </p:txBody>
       </p:sp>
-      <mc:AlternateContent xmlns:mc="http://schemas.openxmlformats.org/markup-compatibility/2006">
-        <mc:Choice xmlns:a14="http://schemas.microsoft.com/office/drawing/2010/main" Requires="a14">
+      <mc:AlternateContent xmlns:mc="http://schemas.openxmlformats.org/markup-compatibility/2006" xmlns:a14="http://schemas.microsoft.com/office/drawing/2010/main">
+        <mc:Choice Requires="a14">
           <p:sp>
             <p:nvSpPr>
               <p:cNvPr id="26" name="TextBox 25">
                 <a:extLst>
                   <a:ext uri="{FF2B5EF4-FFF2-40B4-BE49-F238E27FC236}">
-                    <a16:creationId xmlns:a16="http://schemas.microsoft.com/office/drawing/2014/main" id="{88705E41-1027-44E2-8723-0124A75626F1}"/>
+                    <a16:creationId xmlns="" xmlns:a16="http://schemas.microsoft.com/office/drawing/2014/main" id="{88705E41-1027-44E2-8723-0124A75626F1}"/>
                   </a:ext>
                 </a:extLst>
               </p:cNvPr>
@@ -3904,7 +3906,7 @@
             </p:nvSpPr>
             <p:spPr>
               <a:xfrm>
-                <a:off x="10965226" y="4317929"/>
+                <a:off x="10965226" y="3887224"/>
                 <a:ext cx="697133" cy="523220"/>
               </a:xfrm>
               <a:prstGeom prst="rect">
@@ -3918,6 +3920,7 @@
               </a:bodyPr>
               <a:lstStyle/>
               <a:p>
+                <a:pPr/>
                 <a14:m>
                   <m:oMathPara xmlns:m="http://schemas.openxmlformats.org/officeDocument/2006/math">
                     <m:oMathParaPr>
@@ -3928,7 +3931,7 @@
                         <m:sSubPr>
                           <m:ctrlPr>
                             <a:rPr lang="en-US" altLang="ko-KR" sz="2800" b="0" i="1" smtClean="0">
-                              <a:latin typeface="Cambria Math" panose="02040503050406030204" pitchFamily="18" charset="0"/>
+                              <a:latin typeface="Cambria Math"/>
                             </a:rPr>
                           </m:ctrlPr>
                         </m:sSubPr>
@@ -3938,7 +3941,7 @@
                               <m:chr m:val="⃗"/>
                               <m:ctrlPr>
                                 <a:rPr lang="en-US" altLang="ko-KR" sz="2800" b="0" i="1" smtClean="0">
-                                  <a:latin typeface="Cambria Math" panose="02040503050406030204" pitchFamily="18" charset="0"/>
+                                  <a:latin typeface="Cambria Math"/>
                                 </a:rPr>
                               </m:ctrlPr>
                             </m:accPr>
@@ -3969,13 +3972,13 @@
             </p:txBody>
           </p:sp>
         </mc:Choice>
-        <mc:Fallback>
+        <mc:Fallback xmlns="">
           <p:sp>
             <p:nvSpPr>
               <p:cNvPr id="26" name="TextBox 25">
                 <a:extLst>
                   <a:ext uri="{FF2B5EF4-FFF2-40B4-BE49-F238E27FC236}">
-                    <a16:creationId xmlns:a16="http://schemas.microsoft.com/office/drawing/2014/main" id="{88705E41-1027-44E2-8723-0124A75626F1}"/>
+                    <a16:creationId xmlns:a16="http://schemas.microsoft.com/office/drawing/2014/main" xmlns:a14="http://schemas.microsoft.com/office/drawing/2010/main" xmlns="" id="{88705E41-1027-44E2-8723-0124A75626F1}"/>
                   </a:ext>
                 </a:extLst>
               </p:cNvPr>
@@ -3986,13 +3989,13 @@
             </p:nvSpPr>
             <p:spPr>
               <a:xfrm>
-                <a:off x="10965226" y="4317929"/>
+                <a:off x="10965226" y="3887224"/>
                 <a:ext cx="697133" cy="523220"/>
               </a:xfrm>
               <a:prstGeom prst="rect">
                 <a:avLst/>
               </a:prstGeom>
-              <a:blipFill>
+              <a:blipFill rotWithShape="1">
                 <a:blip r:embed="rId3"/>
                 <a:stretch>
                   <a:fillRect/>
@@ -4014,14 +4017,14 @@
           </p:sp>
         </mc:Fallback>
       </mc:AlternateContent>
-      <mc:AlternateContent xmlns:mc="http://schemas.openxmlformats.org/markup-compatibility/2006">
-        <mc:Choice xmlns:a14="http://schemas.microsoft.com/office/drawing/2010/main" Requires="a14">
+      <mc:AlternateContent xmlns:mc="http://schemas.openxmlformats.org/markup-compatibility/2006" xmlns:a14="http://schemas.microsoft.com/office/drawing/2010/main">
+        <mc:Choice Requires="a14">
           <p:sp>
             <p:nvSpPr>
               <p:cNvPr id="27" name="TextBox 26">
                 <a:extLst>
                   <a:ext uri="{FF2B5EF4-FFF2-40B4-BE49-F238E27FC236}">
-                    <a16:creationId xmlns:a16="http://schemas.microsoft.com/office/drawing/2014/main" id="{6D6D9840-8DA0-488C-90B8-C6A3B0B06C5F}"/>
+                    <a16:creationId xmlns="" xmlns:a16="http://schemas.microsoft.com/office/drawing/2014/main" id="{6D6D9840-8DA0-488C-90B8-C6A3B0B06C5F}"/>
                   </a:ext>
                 </a:extLst>
               </p:cNvPr>
@@ -4030,7 +4033,7 @@
             </p:nvSpPr>
             <p:spPr>
               <a:xfrm>
-                <a:off x="9386589" y="1723854"/>
+                <a:off x="9386589" y="1293149"/>
                 <a:ext cx="670504" cy="523220"/>
               </a:xfrm>
               <a:prstGeom prst="rect">
@@ -4044,6 +4047,7 @@
               </a:bodyPr>
               <a:lstStyle/>
               <a:p>
+                <a:pPr/>
                 <a14:m>
                   <m:oMathPara xmlns:m="http://schemas.openxmlformats.org/officeDocument/2006/math">
                     <m:oMathParaPr>
@@ -4054,7 +4058,7 @@
                         <m:sSubPr>
                           <m:ctrlPr>
                             <a:rPr lang="en-US" altLang="ko-KR" sz="2800" b="0" i="1" smtClean="0">
-                              <a:latin typeface="Cambria Math" panose="02040503050406030204" pitchFamily="18" charset="0"/>
+                              <a:latin typeface="Cambria Math"/>
                             </a:rPr>
                           </m:ctrlPr>
                         </m:sSubPr>
@@ -4064,7 +4068,7 @@
                               <m:chr m:val="⃗"/>
                               <m:ctrlPr>
                                 <a:rPr lang="en-US" altLang="ko-KR" sz="2800" b="0" i="1" smtClean="0">
-                                  <a:latin typeface="Cambria Math" panose="02040503050406030204" pitchFamily="18" charset="0"/>
+                                  <a:latin typeface="Cambria Math"/>
                                 </a:rPr>
                               </m:ctrlPr>
                             </m:accPr>
@@ -4095,13 +4099,13 @@
             </p:txBody>
           </p:sp>
         </mc:Choice>
-        <mc:Fallback>
+        <mc:Fallback xmlns="">
           <p:sp>
             <p:nvSpPr>
               <p:cNvPr id="27" name="TextBox 26">
                 <a:extLst>
                   <a:ext uri="{FF2B5EF4-FFF2-40B4-BE49-F238E27FC236}">
-                    <a16:creationId xmlns:a16="http://schemas.microsoft.com/office/drawing/2014/main" id="{6D6D9840-8DA0-488C-90B8-C6A3B0B06C5F}"/>
+                    <a16:creationId xmlns:a16="http://schemas.microsoft.com/office/drawing/2014/main" xmlns:a14="http://schemas.microsoft.com/office/drawing/2010/main" xmlns="" id="{6D6D9840-8DA0-488C-90B8-C6A3B0B06C5F}"/>
                   </a:ext>
                 </a:extLst>
               </p:cNvPr>
@@ -4112,13 +4116,13 @@
             </p:nvSpPr>
             <p:spPr>
               <a:xfrm>
-                <a:off x="9386589" y="1723854"/>
+                <a:off x="9386589" y="1293149"/>
                 <a:ext cx="670504" cy="523220"/>
               </a:xfrm>
               <a:prstGeom prst="rect">
                 <a:avLst/>
               </a:prstGeom>
-              <a:blipFill>
+              <a:blipFill rotWithShape="1">
                 <a:blip r:embed="rId4"/>
                 <a:stretch>
                   <a:fillRect/>
@@ -4140,14 +4144,14 @@
           </p:sp>
         </mc:Fallback>
       </mc:AlternateContent>
-      <mc:AlternateContent xmlns:mc="http://schemas.openxmlformats.org/markup-compatibility/2006">
-        <mc:Choice xmlns:a14="http://schemas.microsoft.com/office/drawing/2010/main" Requires="a14">
+      <mc:AlternateContent xmlns:mc="http://schemas.openxmlformats.org/markup-compatibility/2006" xmlns:a14="http://schemas.microsoft.com/office/drawing/2010/main">
+        <mc:Choice Requires="a14">
           <p:sp>
             <p:nvSpPr>
               <p:cNvPr id="28" name="TextBox 27">
                 <a:extLst>
                   <a:ext uri="{FF2B5EF4-FFF2-40B4-BE49-F238E27FC236}">
-                    <a16:creationId xmlns:a16="http://schemas.microsoft.com/office/drawing/2014/main" id="{6A3CD2A3-4ADE-4A64-B05C-B17F8C406202}"/>
+                    <a16:creationId xmlns="" xmlns:a16="http://schemas.microsoft.com/office/drawing/2014/main" id="{6A3CD2A3-4ADE-4A64-B05C-B17F8C406202}"/>
                   </a:ext>
                 </a:extLst>
               </p:cNvPr>
@@ -4156,7 +4160,7 @@
             </p:nvSpPr>
             <p:spPr>
               <a:xfrm>
-                <a:off x="8034992" y="4036559"/>
+                <a:off x="8034992" y="3605854"/>
                 <a:ext cx="523796" cy="523220"/>
               </a:xfrm>
               <a:prstGeom prst="rect">
@@ -4170,6 +4174,7 @@
               </a:bodyPr>
               <a:lstStyle/>
               <a:p>
+                <a:pPr/>
                 <a14:m>
                   <m:oMathPara xmlns:m="http://schemas.openxmlformats.org/officeDocument/2006/math">
                     <m:oMathParaPr>
@@ -4190,13 +4195,13 @@
             </p:txBody>
           </p:sp>
         </mc:Choice>
-        <mc:Fallback>
+        <mc:Fallback xmlns="">
           <p:sp>
             <p:nvSpPr>
               <p:cNvPr id="28" name="TextBox 27">
                 <a:extLst>
                   <a:ext uri="{FF2B5EF4-FFF2-40B4-BE49-F238E27FC236}">
-                    <a16:creationId xmlns:a16="http://schemas.microsoft.com/office/drawing/2014/main" id="{6A3CD2A3-4ADE-4A64-B05C-B17F8C406202}"/>
+                    <a16:creationId xmlns:a16="http://schemas.microsoft.com/office/drawing/2014/main" xmlns:a14="http://schemas.microsoft.com/office/drawing/2010/main" xmlns="" id="{6A3CD2A3-4ADE-4A64-B05C-B17F8C406202}"/>
                   </a:ext>
                 </a:extLst>
               </p:cNvPr>
@@ -4207,13 +4212,13 @@
             </p:nvSpPr>
             <p:spPr>
               <a:xfrm>
-                <a:off x="8034992" y="4036559"/>
+                <a:off x="8034992" y="3605854"/>
                 <a:ext cx="523796" cy="523220"/>
               </a:xfrm>
               <a:prstGeom prst="rect">
                 <a:avLst/>
               </a:prstGeom>
-              <a:blipFill>
+              <a:blipFill rotWithShape="1">
                 <a:blip r:embed="rId5"/>
                 <a:stretch>
                   <a:fillRect/>
@@ -4240,7 +4245,7 @@
           <p:cNvPr id="29" name="직선 화살표 연결선 28">
             <a:extLst>
               <a:ext uri="{FF2B5EF4-FFF2-40B4-BE49-F238E27FC236}">
-                <a16:creationId xmlns:a16="http://schemas.microsoft.com/office/drawing/2014/main" id="{C816B0C7-93C9-4BB2-AAE2-1B1B9C98AC9D}"/>
+                <a16:creationId xmlns="" xmlns:a16="http://schemas.microsoft.com/office/drawing/2014/main" id="{C816B0C7-93C9-4BB2-AAE2-1B1B9C98AC9D}"/>
               </a:ext>
             </a:extLst>
           </p:cNvPr>
@@ -4251,7 +4256,7 @@
         </p:nvCxnSpPr>
         <p:spPr>
           <a:xfrm>
-            <a:off x="7553763" y="4567384"/>
+            <a:off x="7553763" y="4136679"/>
             <a:ext cx="2488361" cy="0"/>
           </a:xfrm>
           <a:prstGeom prst="straightConnector1">
@@ -4281,14 +4286,14 @@
           </a:fontRef>
         </p:style>
       </p:cxnSp>
-      <mc:AlternateContent xmlns:mc="http://schemas.openxmlformats.org/markup-compatibility/2006">
-        <mc:Choice xmlns:a14="http://schemas.microsoft.com/office/drawing/2010/main" Requires="a14">
+      <mc:AlternateContent xmlns:mc="http://schemas.openxmlformats.org/markup-compatibility/2006" xmlns:a14="http://schemas.microsoft.com/office/drawing/2010/main">
+        <mc:Choice Requires="a14">
           <p:sp>
             <p:nvSpPr>
               <p:cNvPr id="32" name="TextBox 31">
                 <a:extLst>
                   <a:ext uri="{FF2B5EF4-FFF2-40B4-BE49-F238E27FC236}">
-                    <a16:creationId xmlns:a16="http://schemas.microsoft.com/office/drawing/2014/main" id="{4924D1C5-16F6-4CE6-8427-0F351AD57C1C}"/>
+                    <a16:creationId xmlns="" xmlns:a16="http://schemas.microsoft.com/office/drawing/2014/main" id="{4924D1C5-16F6-4CE6-8427-0F351AD57C1C}"/>
                   </a:ext>
                 </a:extLst>
               </p:cNvPr>
@@ -4297,8 +4302,8 @@
             </p:nvSpPr>
             <p:spPr>
               <a:xfrm>
-                <a:off x="7967821" y="4610926"/>
-                <a:ext cx="1660242" cy="523220"/>
+                <a:off x="8178810" y="4663669"/>
+                <a:ext cx="2673836" cy="944169"/>
               </a:xfrm>
               <a:prstGeom prst="rect">
                 <a:avLst/>
@@ -4311,17 +4316,18 @@
               </a:bodyPr>
               <a:lstStyle/>
               <a:p>
+                <a:pPr/>
                 <a14:m>
                   <m:oMathPara xmlns:m="http://schemas.openxmlformats.org/officeDocument/2006/math">
                     <m:oMathParaPr>
-                      <m:jc m:val="centerGroup"/>
+                      <m:jc m:val="center"/>
                     </m:oMathParaPr>
                     <m:oMath xmlns:m="http://schemas.openxmlformats.org/officeDocument/2006/math">
                       <m:sSub>
                         <m:sSubPr>
                           <m:ctrlPr>
                             <a:rPr lang="en-US" altLang="ko-KR" sz="2800" b="0" i="1" smtClean="0">
-                              <a:latin typeface="Cambria Math" panose="02040503050406030204" pitchFamily="18" charset="0"/>
+                              <a:latin typeface="Cambria Math"/>
                             </a:rPr>
                           </m:ctrlPr>
                         </m:sSubPr>
@@ -4331,14 +4337,14 @@
                               <m:chr m:val="⃗"/>
                               <m:ctrlPr>
                                 <a:rPr lang="en-US" altLang="ko-KR" sz="2800" b="0" i="1" smtClean="0">
-                                  <a:latin typeface="Cambria Math" panose="02040503050406030204" pitchFamily="18" charset="0"/>
+                                  <a:latin typeface="Cambria Math"/>
                                 </a:rPr>
                               </m:ctrlPr>
                             </m:accPr>
                             <m:e>
                               <m:r>
                                 <a:rPr lang="en-US" altLang="ko-KR" sz="2800" b="0" i="1" smtClean="0">
-                                  <a:latin typeface="Cambria Math" panose="02040503050406030204" pitchFamily="18" charset="0"/>
+                                  <a:latin typeface="Cambria Math"/>
                                 </a:rPr>
                                 <m:t>𝑣</m:t>
                               </m:r>
@@ -4348,7 +4354,7 @@
                         <m:sub>
                           <m:r>
                             <a:rPr lang="en-US" altLang="ko-KR" sz="2800" b="0" i="1" smtClean="0">
-                              <a:latin typeface="Cambria Math" panose="02040503050406030204" pitchFamily="18" charset="0"/>
+                              <a:latin typeface="Cambria Math"/>
                             </a:rPr>
                             <m:t>1</m:t>
                           </m:r>
@@ -4356,7 +4362,7 @@
                       </m:sSub>
                       <m:r>
                         <a:rPr lang="en-US" altLang="ko-KR" sz="2800" b="0" i="1" smtClean="0">
-                          <a:latin typeface="Cambria Math" panose="02040503050406030204" pitchFamily="18" charset="0"/>
+                          <a:latin typeface="Cambria Math"/>
                         </a:rPr>
                         <m:t>⋅</m:t>
                       </m:r>
@@ -4364,7 +4370,7 @@
                         <m:sSubPr>
                           <m:ctrlPr>
                             <a:rPr lang="en-US" altLang="ko-KR" sz="2800" b="0" i="1" smtClean="0">
-                              <a:latin typeface="Cambria Math" panose="02040503050406030204" pitchFamily="18" charset="0"/>
+                              <a:latin typeface="Cambria Math"/>
                             </a:rPr>
                           </m:ctrlPr>
                         </m:sSubPr>
@@ -4374,14 +4380,14 @@
                               <m:chr m:val="⃗"/>
                               <m:ctrlPr>
                                 <a:rPr lang="en-US" altLang="ko-KR" sz="2800" b="0" i="1" smtClean="0">
-                                  <a:latin typeface="Cambria Math" panose="02040503050406030204" pitchFamily="18" charset="0"/>
+                                  <a:latin typeface="Cambria Math"/>
                                 </a:rPr>
                               </m:ctrlPr>
                             </m:accPr>
                             <m:e>
                               <m:r>
                                 <a:rPr lang="en-US" altLang="ko-KR" sz="2800" b="0" i="1" smtClean="0">
-                                  <a:latin typeface="Cambria Math" panose="02040503050406030204" pitchFamily="18" charset="0"/>
+                                  <a:latin typeface="Cambria Math"/>
                                 </a:rPr>
                                 <m:t>𝑣</m:t>
                               </m:r>
@@ -4391,12 +4397,145 @@
                         <m:sub>
                           <m:r>
                             <a:rPr lang="en-US" altLang="ko-KR" sz="2800" b="0" i="1" smtClean="0">
-                              <a:latin typeface="Cambria Math" panose="02040503050406030204" pitchFamily="18" charset="0"/>
+                              <a:latin typeface="Cambria Math"/>
                             </a:rPr>
                             <m:t>2</m:t>
                           </m:r>
                         </m:sub>
                       </m:sSub>
+                      <m:r>
+                        <a:rPr lang="en-US" altLang="ko-KR" sz="2800" b="0" i="1" smtClean="0">
+                          <a:latin typeface="Cambria Math"/>
+                        </a:rPr>
+                        <m:t>= </m:t>
+                      </m:r>
+                      <m:r>
+                        <a:rPr lang="en-US" altLang="ko-KR" sz="2800" i="1" smtClean="0">
+                          <a:latin typeface="Cambria Math"/>
+                        </a:rPr>
+                        <m:t>|</m:t>
+                      </m:r>
+                      <m:sSub>
+                        <m:sSubPr>
+                          <m:ctrlPr>
+                            <a:rPr lang="en-US" altLang="ko-KR" sz="2800" b="0" i="1" smtClean="0">
+                              <a:latin typeface="Cambria Math"/>
+                            </a:rPr>
+                          </m:ctrlPr>
+                        </m:sSubPr>
+                        <m:e>
+                          <m:acc>
+                            <m:accPr>
+                              <m:chr m:val="⃗"/>
+                              <m:ctrlPr>
+                                <a:rPr lang="en-US" altLang="ko-KR" sz="2800" b="0" i="1" smtClean="0">
+                                  <a:latin typeface="Cambria Math"/>
+                                </a:rPr>
+                              </m:ctrlPr>
+                            </m:accPr>
+                            <m:e>
+                              <m:r>
+                                <a:rPr lang="en-US" altLang="ko-KR" sz="2800" b="0" i="1" smtClean="0">
+                                  <a:latin typeface="Cambria Math"/>
+                                </a:rPr>
+                                <m:t>𝑣</m:t>
+                              </m:r>
+                            </m:e>
+                          </m:acc>
+                        </m:e>
+                        <m:sub>
+                          <m:r>
+                            <a:rPr lang="en-US" altLang="ko-KR" sz="2800" b="0" i="1" smtClean="0">
+                              <a:latin typeface="Cambria Math"/>
+                            </a:rPr>
+                            <m:t>1</m:t>
+                          </m:r>
+                        </m:sub>
+                      </m:sSub>
+                      <m:r>
+                        <a:rPr lang="en-US" altLang="ko-KR" sz="2800" b="0" i="1" smtClean="0">
+                          <a:latin typeface="Cambria Math"/>
+                        </a:rPr>
+                        <m:t>|</m:t>
+                      </m:r>
+                      <m:d>
+                        <m:dPr>
+                          <m:begChr m:val="|"/>
+                          <m:endChr m:val="|"/>
+                          <m:ctrlPr>
+                            <a:rPr lang="en-US" altLang="ko-KR" sz="2800" b="0" i="1" smtClean="0">
+                              <a:latin typeface="Cambria Math"/>
+                            </a:rPr>
+                          </m:ctrlPr>
+                        </m:dPr>
+                        <m:e>
+                          <m:sSub>
+                            <m:sSubPr>
+                              <m:ctrlPr>
+                                <a:rPr lang="en-US" altLang="ko-KR" sz="2800" b="0" i="1" smtClean="0">
+                                  <a:latin typeface="Cambria Math"/>
+                                </a:rPr>
+                              </m:ctrlPr>
+                            </m:sSubPr>
+                            <m:e>
+                              <m:acc>
+                                <m:accPr>
+                                  <m:chr m:val="⃗"/>
+                                  <m:ctrlPr>
+                                    <a:rPr lang="en-US" altLang="ko-KR" sz="2800" b="0" i="1" smtClean="0">
+                                      <a:latin typeface="Cambria Math"/>
+                                    </a:rPr>
+                                  </m:ctrlPr>
+                                </m:accPr>
+                                <m:e>
+                                  <m:r>
+                                    <a:rPr lang="en-US" altLang="ko-KR" sz="2800" b="0" i="1" smtClean="0">
+                                      <a:latin typeface="Cambria Math" panose="02040503050406030204" pitchFamily="18" charset="0"/>
+                                    </a:rPr>
+                                    <m:t>𝑣</m:t>
+                                  </m:r>
+                                </m:e>
+                              </m:acc>
+                            </m:e>
+                            <m:sub>
+                              <m:r>
+                                <a:rPr lang="en-US" altLang="ko-KR" sz="2800" b="0" i="1" smtClean="0">
+                                  <a:latin typeface="Cambria Math" panose="02040503050406030204" pitchFamily="18" charset="0"/>
+                                </a:rPr>
+                                <m:t>2</m:t>
+                              </m:r>
+                            </m:sub>
+                          </m:sSub>
+                        </m:e>
+                      </m:d>
+                      <m:func>
+                        <m:funcPr>
+                          <m:ctrlPr>
+                            <a:rPr lang="en-US" altLang="ko-KR" sz="2800" b="0" i="1" smtClean="0">
+                              <a:latin typeface="Cambria Math"/>
+                            </a:rPr>
+                          </m:ctrlPr>
+                        </m:funcPr>
+                        <m:fName>
+                          <m:r>
+                            <m:rPr>
+                              <m:sty m:val="p"/>
+                            </m:rPr>
+                            <a:rPr lang="en-US" altLang="ko-KR" sz="2800" b="0" i="0" smtClean="0">
+                              <a:latin typeface="Cambria Math"/>
+                            </a:rPr>
+                            <m:t>cos</m:t>
+                          </m:r>
+                        </m:fName>
+                        <m:e>
+                          <m:r>
+                            <a:rPr lang="en-US" altLang="ko-KR" sz="2800" b="0" i="1" smtClean="0">
+                              <a:latin typeface="Cambria Math"/>
+                            </a:rPr>
+                            <m:t>𝜃</m:t>
+                          </m:r>
+                        </m:e>
+                      </m:func>
                     </m:oMath>
                   </m:oMathPara>
                 </a14:m>
@@ -4405,13 +4544,13 @@
             </p:txBody>
           </p:sp>
         </mc:Choice>
-        <mc:Fallback>
+        <mc:Fallback xmlns="">
           <p:sp>
             <p:nvSpPr>
               <p:cNvPr id="32" name="TextBox 31">
                 <a:extLst>
                   <a:ext uri="{FF2B5EF4-FFF2-40B4-BE49-F238E27FC236}">
-                    <a16:creationId xmlns:a16="http://schemas.microsoft.com/office/drawing/2014/main" id="{4924D1C5-16F6-4CE6-8427-0F351AD57C1C}"/>
+                    <a16:creationId xmlns:a16="http://schemas.microsoft.com/office/drawing/2014/main" xmlns:a14="http://schemas.microsoft.com/office/drawing/2010/main" xmlns="" id="{4924D1C5-16F6-4CE6-8427-0F351AD57C1C}"/>
                   </a:ext>
                 </a:extLst>
               </p:cNvPr>
@@ -4422,13 +4561,13 @@
             </p:nvSpPr>
             <p:spPr>
               <a:xfrm>
-                <a:off x="7967821" y="4610926"/>
-                <a:ext cx="1660242" cy="523220"/>
+                <a:off x="8178810" y="4663669"/>
+                <a:ext cx="2673836" cy="944169"/>
               </a:xfrm>
               <a:prstGeom prst="rect">
                 <a:avLst/>
               </a:prstGeom>
-              <a:blipFill>
+              <a:blipFill rotWithShape="1">
                 <a:blip r:embed="rId6"/>
                 <a:stretch>
                   <a:fillRect/>
@@ -4455,7 +4594,7 @@
           <p:cNvPr id="34" name="같음 기호 33">
             <a:extLst>
               <a:ext uri="{FF2B5EF4-FFF2-40B4-BE49-F238E27FC236}">
-                <a16:creationId xmlns:a16="http://schemas.microsoft.com/office/drawing/2014/main" id="{1F5F4CD1-DC59-4AC4-8265-68A6AF3107F8}"/>
+                <a16:creationId xmlns="" xmlns:a16="http://schemas.microsoft.com/office/drawing/2014/main" id="{1F5F4CD1-DC59-4AC4-8265-68A6AF3107F8}"/>
               </a:ext>
             </a:extLst>
           </p:cNvPr>
@@ -4514,7 +4653,7 @@
           <p:cNvPr id="36" name="TextBox 35">
             <a:extLst>
               <a:ext uri="{FF2B5EF4-FFF2-40B4-BE49-F238E27FC236}">
-                <a16:creationId xmlns:a16="http://schemas.microsoft.com/office/drawing/2014/main" id="{36442068-909F-4E69-803E-34867444CAF5}"/>
+                <a16:creationId xmlns="" xmlns:a16="http://schemas.microsoft.com/office/drawing/2014/main" id="{36442068-909F-4E69-803E-34867444CAF5}"/>
               </a:ext>
             </a:extLst>
           </p:cNvPr>
@@ -4552,10 +4691,743 @@
           </a:p>
         </p:txBody>
       </p:sp>
+      <mc:AlternateContent xmlns:mc="http://schemas.openxmlformats.org/markup-compatibility/2006" xmlns:a14="http://schemas.microsoft.com/office/drawing/2010/main">
+        <mc:Choice Requires="a14">
+          <p:sp>
+            <p:nvSpPr>
+              <p:cNvPr id="16" name="TextBox 15">
+                <a:extLst>
+                  <a:ext uri="{FF2B5EF4-FFF2-40B4-BE49-F238E27FC236}">
+                    <a16:creationId xmlns="" xmlns:a16="http://schemas.microsoft.com/office/drawing/2014/main" id="{4924D1C5-16F6-4CE6-8427-0F351AD57C1C}"/>
+                  </a:ext>
+                </a:extLst>
+              </p:cNvPr>
+              <p:cNvSpPr txBox="1"/>
+              <p:nvPr/>
+            </p:nvSpPr>
+            <p:spPr>
+              <a:xfrm>
+                <a:off x="7682479" y="4131823"/>
+                <a:ext cx="2209782" cy="523220"/>
+              </a:xfrm>
+              <a:prstGeom prst="rect">
+                <a:avLst/>
+              </a:prstGeom>
+              <a:noFill/>
+            </p:spPr>
+            <p:txBody>
+              <a:bodyPr wrap="square" rtlCol="0">
+                <a:spAutoFit/>
+              </a:bodyPr>
+              <a:lstStyle/>
+              <a:p>
+                <a:pPr/>
+                <a14:m>
+                  <m:oMathPara xmlns:m="http://schemas.openxmlformats.org/officeDocument/2006/math">
+                    <m:oMathParaPr>
+                      <m:jc m:val="centerGroup"/>
+                    </m:oMathParaPr>
+                    <m:oMath xmlns:m="http://schemas.openxmlformats.org/officeDocument/2006/math">
+                      <m:d>
+                        <m:dPr>
+                          <m:begChr m:val="|"/>
+                          <m:endChr m:val="|"/>
+                          <m:ctrlPr>
+                            <a:rPr lang="en-US" altLang="ko-KR" sz="2800" b="0" i="1" smtClean="0">
+                              <a:solidFill>
+                                <a:srgbClr val="FF0000"/>
+                              </a:solidFill>
+                              <a:latin typeface="Cambria Math"/>
+                            </a:rPr>
+                          </m:ctrlPr>
+                        </m:dPr>
+                        <m:e>
+                          <m:sSub>
+                            <m:sSubPr>
+                              <m:ctrlPr>
+                                <a:rPr lang="en-US" altLang="ko-KR" sz="2800" b="0" i="1" smtClean="0">
+                                  <a:solidFill>
+                                    <a:srgbClr val="FF0000"/>
+                                  </a:solidFill>
+                                  <a:latin typeface="Cambria Math"/>
+                                </a:rPr>
+                              </m:ctrlPr>
+                            </m:sSubPr>
+                            <m:e>
+                              <m:acc>
+                                <m:accPr>
+                                  <m:chr m:val="⃗"/>
+                                  <m:ctrlPr>
+                                    <a:rPr lang="en-US" altLang="ko-KR" sz="2800" b="0" i="1" smtClean="0">
+                                      <a:solidFill>
+                                        <a:srgbClr val="FF0000"/>
+                                      </a:solidFill>
+                                      <a:latin typeface="Cambria Math"/>
+                                    </a:rPr>
+                                  </m:ctrlPr>
+                                </m:accPr>
+                                <m:e>
+                                  <m:r>
+                                    <a:rPr lang="en-US" altLang="ko-KR" sz="2800" b="0" i="1" smtClean="0">
+                                      <a:solidFill>
+                                        <a:srgbClr val="FF0000"/>
+                                      </a:solidFill>
+                                      <a:latin typeface="Cambria Math" panose="02040503050406030204" pitchFamily="18" charset="0"/>
+                                    </a:rPr>
+                                    <m:t>𝑣</m:t>
+                                  </m:r>
+                                </m:e>
+                              </m:acc>
+                            </m:e>
+                            <m:sub>
+                              <m:r>
+                                <a:rPr lang="en-US" altLang="ko-KR" sz="2800" b="0" i="1" smtClean="0">
+                                  <a:solidFill>
+                                    <a:srgbClr val="FF0000"/>
+                                  </a:solidFill>
+                                  <a:latin typeface="Cambria Math" panose="02040503050406030204" pitchFamily="18" charset="0"/>
+                                </a:rPr>
+                                <m:t>2</m:t>
+                              </m:r>
+                            </m:sub>
+                          </m:sSub>
+                        </m:e>
+                      </m:d>
+                      <m:func>
+                        <m:funcPr>
+                          <m:ctrlPr>
+                            <a:rPr lang="en-US" altLang="ko-KR" sz="2800" b="0" i="1" smtClean="0">
+                              <a:solidFill>
+                                <a:srgbClr val="FF0000"/>
+                              </a:solidFill>
+                              <a:latin typeface="Cambria Math"/>
+                            </a:rPr>
+                          </m:ctrlPr>
+                        </m:funcPr>
+                        <m:fName>
+                          <m:r>
+                            <m:rPr>
+                              <m:sty m:val="p"/>
+                            </m:rPr>
+                            <a:rPr lang="en-US" altLang="ko-KR" sz="2800" b="0" i="0" smtClean="0">
+                              <a:solidFill>
+                                <a:srgbClr val="FF0000"/>
+                              </a:solidFill>
+                              <a:latin typeface="Cambria Math"/>
+                            </a:rPr>
+                            <m:t>cos</m:t>
+                          </m:r>
+                        </m:fName>
+                        <m:e>
+                          <m:r>
+                            <a:rPr lang="en-US" altLang="ko-KR" sz="2800" b="0" i="1" smtClean="0">
+                              <a:solidFill>
+                                <a:srgbClr val="FF0000"/>
+                              </a:solidFill>
+                              <a:latin typeface="Cambria Math"/>
+                            </a:rPr>
+                            <m:t>𝜃</m:t>
+                          </m:r>
+                        </m:e>
+                      </m:func>
+                    </m:oMath>
+                  </m:oMathPara>
+                </a14:m>
+                <a:endParaRPr lang="ko-KR" altLang="en-US" sz="2800" dirty="0">
+                  <a:solidFill>
+                    <a:srgbClr val="FF0000"/>
+                  </a:solidFill>
+                </a:endParaRPr>
+              </a:p>
+            </p:txBody>
+          </p:sp>
+        </mc:Choice>
+        <mc:Fallback xmlns="">
+          <p:sp>
+            <p:nvSpPr>
+              <p:cNvPr id="16" name="TextBox 15">
+                <a:extLst>
+                  <a:ext uri="{FF2B5EF4-FFF2-40B4-BE49-F238E27FC236}">
+                    <a16:creationId xmlns:a16="http://schemas.microsoft.com/office/drawing/2014/main" xmlns:a14="http://schemas.microsoft.com/office/drawing/2010/main" xmlns="" id="{4924D1C5-16F6-4CE6-8427-0F351AD57C1C}"/>
+                  </a:ext>
+                </a:extLst>
+              </p:cNvPr>
+              <p:cNvSpPr txBox="1">
+                <a:spLocks noRot="1" noChangeAspect="1" noMove="1" noResize="1" noEditPoints="1" noAdjustHandles="1" noChangeArrowheads="1" noChangeShapeType="1" noTextEdit="1"/>
+              </p:cNvSpPr>
+              <p:nvPr/>
+            </p:nvSpPr>
+            <p:spPr>
+              <a:xfrm>
+                <a:off x="7682479" y="4131823"/>
+                <a:ext cx="2209782" cy="523220"/>
+              </a:xfrm>
+              <a:prstGeom prst="rect">
+                <a:avLst/>
+              </a:prstGeom>
+              <a:blipFill rotWithShape="1">
+                <a:blip r:embed="rId7"/>
+                <a:stretch>
+                  <a:fillRect/>
+                </a:stretch>
+              </a:blipFill>
+            </p:spPr>
+            <p:txBody>
+              <a:bodyPr/>
+              <a:lstStyle/>
+              <a:p>
+                <a:r>
+                  <a:rPr lang="ko-KR" altLang="en-US">
+                    <a:noFill/>
+                  </a:rPr>
+                  <a:t> </a:t>
+                </a:r>
+              </a:p>
+            </p:txBody>
+          </p:sp>
+        </mc:Fallback>
+      </mc:AlternateContent>
     </p:spTree>
     <p:extLst>
       <p:ext uri="{BB962C8B-B14F-4D97-AF65-F5344CB8AC3E}">
         <p14:creationId xmlns:p14="http://schemas.microsoft.com/office/powerpoint/2010/main" val="4231137305"/>
+      </p:ext>
+    </p:extLst>
+  </p:cSld>
+  <p:clrMapOvr>
+    <a:masterClrMapping/>
+  </p:clrMapOvr>
+</p:sld>
+</file>
+
+<file path=ppt/slides/slide2.xml><?xml version="1.0" encoding="utf-8"?>
+<p:sld xmlns:a="http://schemas.openxmlformats.org/drawingml/2006/main" xmlns:r="http://schemas.openxmlformats.org/officeDocument/2006/relationships" xmlns:p="http://schemas.openxmlformats.org/presentationml/2006/main">
+  <p:cSld>
+    <p:spTree>
+      <p:nvGrpSpPr>
+        <p:cNvPr id="1" name=""/>
+        <p:cNvGrpSpPr/>
+        <p:nvPr/>
+      </p:nvGrpSpPr>
+      <p:grpSpPr>
+        <a:xfrm>
+          <a:off x="0" y="0"/>
+          <a:ext cx="0" cy="0"/>
+          <a:chOff x="0" y="0"/>
+          <a:chExt cx="0" cy="0"/>
+        </a:xfrm>
+      </p:grpSpPr>
+      <p:pic>
+        <p:nvPicPr>
+          <p:cNvPr id="1026" name="Picture 2"/>
+          <p:cNvPicPr>
+            <a:picLocks noChangeAspect="1" noChangeArrowheads="1"/>
+          </p:cNvPicPr>
+          <p:nvPr/>
+        </p:nvPicPr>
+        <p:blipFill>
+          <a:blip r:embed="rId2">
+            <a:extLst>
+              <a:ext uri="{28A0092B-C50C-407E-A947-70E740481C1C}">
+                <a14:useLocalDpi xmlns:a14="http://schemas.microsoft.com/office/drawing/2010/main" val="0"/>
+              </a:ext>
+            </a:extLst>
+          </a:blip>
+          <a:srcRect/>
+          <a:stretch>
+            <a:fillRect/>
+          </a:stretch>
+        </p:blipFill>
+        <p:spPr bwMode="auto">
+          <a:xfrm>
+            <a:off x="4299906" y="576775"/>
+            <a:ext cx="3592190" cy="5704450"/>
+          </a:xfrm>
+          <a:prstGeom prst="rect">
+            <a:avLst/>
+          </a:prstGeom>
+          <a:noFill/>
+          <a:ln>
+            <a:noFill/>
+          </a:ln>
+          <a:effectLst/>
+          <a:extLst>
+            <a:ext uri="{909E8E84-426E-40DD-AFC4-6F175D3DCCD1}">
+              <a14:hiddenFill xmlns:a14="http://schemas.microsoft.com/office/drawing/2010/main">
+                <a:solidFill>
+                  <a:schemeClr val="accent1"/>
+                </a:solidFill>
+              </a14:hiddenFill>
+            </a:ext>
+            <a:ext uri="{91240B29-F687-4F45-9708-019B960494DF}">
+              <a14:hiddenLine xmlns:a14="http://schemas.microsoft.com/office/drawing/2010/main" w="9525">
+                <a:solidFill>
+                  <a:schemeClr val="tx1"/>
+                </a:solidFill>
+                <a:miter lim="800000"/>
+                <a:headEnd/>
+                <a:tailEnd/>
+              </a14:hiddenLine>
+            </a:ext>
+            <a:ext uri="{AF507438-7753-43E0-B8FC-AC1667EBCBE1}">
+              <a14:hiddenEffects xmlns:a14="http://schemas.microsoft.com/office/drawing/2010/main">
+                <a:effectLst>
+                  <a:outerShdw dist="35921" dir="2700000" algn="ctr" rotWithShape="0">
+                    <a:schemeClr val="bg2"/>
+                  </a:outerShdw>
+                </a:effectLst>
+              </a14:hiddenEffects>
+            </a:ext>
+          </a:extLst>
+        </p:spPr>
+      </p:pic>
+      <mc:AlternateContent xmlns:mc="http://schemas.openxmlformats.org/markup-compatibility/2006">
+        <mc:Choice xmlns:a14="http://schemas.microsoft.com/office/drawing/2010/main" Requires="a14">
+          <p:sp>
+            <p:nvSpPr>
+              <p:cNvPr id="4" name="TextBox 3"/>
+              <p:cNvSpPr txBox="1"/>
+              <p:nvPr/>
+            </p:nvSpPr>
+            <p:spPr>
+              <a:xfrm>
+                <a:off x="4867421" y="5331655"/>
+                <a:ext cx="394660" cy="369332"/>
+              </a:xfrm>
+              <a:prstGeom prst="rect">
+                <a:avLst/>
+              </a:prstGeom>
+              <a:noFill/>
+            </p:spPr>
+            <p:txBody>
+              <a:bodyPr wrap="none" rtlCol="0">
+                <a:spAutoFit/>
+              </a:bodyPr>
+              <a:lstStyle/>
+              <a:p>
+                <a14:m>
+                  <m:oMathPara xmlns:m="http://schemas.openxmlformats.org/officeDocument/2006/math">
+                    <m:oMathParaPr>
+                      <m:jc m:val="centerGroup"/>
+                    </m:oMathParaPr>
+                    <m:oMath xmlns:m="http://schemas.openxmlformats.org/officeDocument/2006/math">
+                      <m:r>
+                        <a:rPr lang="en-US" altLang="ko-KR" b="0" i="1" smtClean="0">
+                          <a:latin typeface="Cambria Math"/>
+                        </a:rPr>
+                        <m:t>0</m:t>
+                      </m:r>
+                    </m:oMath>
+                  </m:oMathPara>
+                </a14:m>
+                <a:endParaRPr lang="ko-KR" altLang="en-US" dirty="0"/>
+              </a:p>
+            </p:txBody>
+          </p:sp>
+        </mc:Choice>
+        <mc:Fallback>
+          <p:sp>
+            <p:nvSpPr>
+              <p:cNvPr id="4" name="TextBox 3"/>
+              <p:cNvSpPr txBox="1">
+                <a:spLocks noRot="1" noChangeAspect="1" noMove="1" noResize="1" noEditPoints="1" noAdjustHandles="1" noChangeArrowheads="1" noChangeShapeType="1" noTextEdit="1"/>
+              </p:cNvSpPr>
+              <p:nvPr/>
+            </p:nvSpPr>
+            <p:spPr>
+              <a:xfrm>
+                <a:off x="4867421" y="5331655"/>
+                <a:ext cx="394660" cy="369332"/>
+              </a:xfrm>
+              <a:prstGeom prst="rect">
+                <a:avLst/>
+              </a:prstGeom>
+              <a:blipFill rotWithShape="1">
+                <a:blip r:embed="rId3"/>
+                <a:stretch>
+                  <a:fillRect/>
+                </a:stretch>
+              </a:blipFill>
+            </p:spPr>
+            <p:txBody>
+              <a:bodyPr/>
+              <a:lstStyle/>
+              <a:p>
+                <a:r>
+                  <a:rPr lang="ko-KR" altLang="en-US">
+                    <a:noFill/>
+                  </a:rPr>
+                  <a:t> </a:t>
+                </a:r>
+              </a:p>
+            </p:txBody>
+          </p:sp>
+        </mc:Fallback>
+      </mc:AlternateContent>
+      <mc:AlternateContent xmlns:mc="http://schemas.openxmlformats.org/markup-compatibility/2006">
+        <mc:Choice xmlns:a14="http://schemas.microsoft.com/office/drawing/2010/main" Requires="a14">
+          <p:sp>
+            <p:nvSpPr>
+              <p:cNvPr id="5" name="TextBox 4"/>
+              <p:cNvSpPr txBox="1"/>
+              <p:nvPr/>
+            </p:nvSpPr>
+            <p:spPr>
+              <a:xfrm>
+                <a:off x="5697416" y="4459458"/>
+                <a:ext cx="481350" cy="461665"/>
+              </a:xfrm>
+              <a:prstGeom prst="rect">
+                <a:avLst/>
+              </a:prstGeom>
+              <a:noFill/>
+            </p:spPr>
+            <p:txBody>
+              <a:bodyPr wrap="none" rtlCol="0">
+                <a:spAutoFit/>
+              </a:bodyPr>
+              <a:lstStyle/>
+              <a:p>
+                <a:pPr/>
+                <a14:m>
+                  <m:oMathPara xmlns:m="http://schemas.openxmlformats.org/officeDocument/2006/math">
+                    <m:oMathParaPr>
+                      <m:jc m:val="center"/>
+                    </m:oMathParaPr>
+                    <m:oMath xmlns:m="http://schemas.openxmlformats.org/officeDocument/2006/math">
+                      <m:r>
+                        <a:rPr lang="en-US" altLang="ko-KR" sz="2400" b="0" i="1" smtClean="0">
+                          <a:solidFill>
+                            <a:srgbClr val="FF0000"/>
+                          </a:solidFill>
+                          <a:latin typeface="Cambria Math"/>
+                        </a:rPr>
+                        <m:t>𝑑</m:t>
+                      </m:r>
+                    </m:oMath>
+                  </m:oMathPara>
+                </a14:m>
+                <a:endParaRPr lang="ko-KR" altLang="en-US" sz="2400" dirty="0">
+                  <a:solidFill>
+                    <a:srgbClr val="FF0000"/>
+                  </a:solidFill>
+                </a:endParaRPr>
+              </a:p>
+            </p:txBody>
+          </p:sp>
+        </mc:Choice>
+        <mc:Fallback>
+          <p:sp>
+            <p:nvSpPr>
+              <p:cNvPr id="5" name="TextBox 4"/>
+              <p:cNvSpPr txBox="1">
+                <a:spLocks noRot="1" noChangeAspect="1" noMove="1" noResize="1" noEditPoints="1" noAdjustHandles="1" noChangeArrowheads="1" noChangeShapeType="1" noTextEdit="1"/>
+              </p:cNvSpPr>
+              <p:nvPr/>
+            </p:nvSpPr>
+            <p:spPr>
+              <a:xfrm>
+                <a:off x="5697416" y="4459458"/>
+                <a:ext cx="481350" cy="461665"/>
+              </a:xfrm>
+              <a:prstGeom prst="rect">
+                <a:avLst/>
+              </a:prstGeom>
+              <a:blipFill rotWithShape="1">
+                <a:blip r:embed="rId4"/>
+                <a:stretch>
+                  <a:fillRect/>
+                </a:stretch>
+              </a:blipFill>
+            </p:spPr>
+            <p:txBody>
+              <a:bodyPr/>
+              <a:lstStyle/>
+              <a:p>
+                <a:r>
+                  <a:rPr lang="ko-KR" altLang="en-US">
+                    <a:noFill/>
+                  </a:rPr>
+                  <a:t> </a:t>
+                </a:r>
+              </a:p>
+            </p:txBody>
+          </p:sp>
+        </mc:Fallback>
+      </mc:AlternateContent>
+      <p:sp>
+        <p:nvSpPr>
+          <p:cNvPr id="6" name="원호 5"/>
+          <p:cNvSpPr/>
+          <p:nvPr/>
+        </p:nvSpPr>
+        <p:spPr>
+          <a:xfrm rot="3984574">
+            <a:off x="4828867" y="3457899"/>
+            <a:ext cx="3009722" cy="858129"/>
+          </a:xfrm>
+          <a:prstGeom prst="arc">
+            <a:avLst>
+              <a:gd name="adj1" fmla="val 18550281"/>
+              <a:gd name="adj2" fmla="val 0"/>
+            </a:avLst>
+          </a:prstGeom>
+          <a:ln>
+            <a:solidFill>
+              <a:schemeClr val="tx1"/>
+            </a:solidFill>
+            <a:prstDash val="dash"/>
+          </a:ln>
+        </p:spPr>
+        <p:style>
+          <a:lnRef idx="1">
+            <a:schemeClr val="accent1"/>
+          </a:lnRef>
+          <a:fillRef idx="0">
+            <a:schemeClr val="accent1"/>
+          </a:fillRef>
+          <a:effectRef idx="0">
+            <a:schemeClr val="accent1"/>
+          </a:effectRef>
+          <a:fontRef idx="minor">
+            <a:schemeClr val="tx1"/>
+          </a:fontRef>
+        </p:style>
+        <p:txBody>
+          <a:bodyPr rtlCol="0" anchor="ctr"/>
+          <a:lstStyle/>
+          <a:p>
+            <a:pPr algn="ctr"/>
+            <a:endParaRPr lang="ko-KR" altLang="en-US"/>
+          </a:p>
+        </p:txBody>
+      </p:sp>
+      <p:sp>
+        <p:nvSpPr>
+          <p:cNvPr id="8" name="원호 7"/>
+          <p:cNvSpPr/>
+          <p:nvPr/>
+        </p:nvSpPr>
+        <p:spPr>
+          <a:xfrm rot="3986126" flipH="1">
+            <a:off x="4433229" y="2710323"/>
+            <a:ext cx="3009722" cy="858129"/>
+          </a:xfrm>
+          <a:prstGeom prst="arc">
+            <a:avLst>
+              <a:gd name="adj1" fmla="val 17904641"/>
+              <a:gd name="adj2" fmla="val 0"/>
+            </a:avLst>
+          </a:prstGeom>
+          <a:ln>
+            <a:solidFill>
+              <a:schemeClr val="tx1"/>
+            </a:solidFill>
+            <a:prstDash val="dash"/>
+          </a:ln>
+        </p:spPr>
+        <p:style>
+          <a:lnRef idx="1">
+            <a:schemeClr val="accent1"/>
+          </a:lnRef>
+          <a:fillRef idx="0">
+            <a:schemeClr val="accent1"/>
+          </a:fillRef>
+          <a:effectRef idx="0">
+            <a:schemeClr val="accent1"/>
+          </a:effectRef>
+          <a:fontRef idx="minor">
+            <a:schemeClr val="tx1"/>
+          </a:fontRef>
+        </p:style>
+        <p:txBody>
+          <a:bodyPr rtlCol="0" anchor="ctr"/>
+          <a:lstStyle/>
+          <a:p>
+            <a:pPr algn="ctr"/>
+            <a:endParaRPr lang="ko-KR" altLang="en-US"/>
+          </a:p>
+        </p:txBody>
+      </p:sp>
+      <mc:AlternateContent xmlns:mc="http://schemas.openxmlformats.org/markup-compatibility/2006">
+        <mc:Choice xmlns:a14="http://schemas.microsoft.com/office/drawing/2010/main" Requires="a14">
+          <p:sp>
+            <p:nvSpPr>
+              <p:cNvPr id="9" name="TextBox 8"/>
+              <p:cNvSpPr txBox="1"/>
+              <p:nvPr/>
+            </p:nvSpPr>
+            <p:spPr>
+              <a:xfrm>
+                <a:off x="6178766" y="3065810"/>
+                <a:ext cx="1513363" cy="549766"/>
+              </a:xfrm>
+              <a:prstGeom prst="rect">
+                <a:avLst/>
+              </a:prstGeom>
+              <a:noFill/>
+            </p:spPr>
+            <p:txBody>
+              <a:bodyPr wrap="none" rtlCol="0">
+                <a:spAutoFit/>
+              </a:bodyPr>
+              <a:lstStyle/>
+              <a:p>
+                <a:pPr/>
+                <a14:m>
+                  <m:oMathPara xmlns:m="http://schemas.openxmlformats.org/officeDocument/2006/math">
+                    <m:oMathParaPr>
+                      <m:jc m:val="center"/>
+                    </m:oMathParaPr>
+                    <m:oMath xmlns:m="http://schemas.openxmlformats.org/officeDocument/2006/math">
+                      <m:rad>
+                        <m:radPr>
+                          <m:degHide m:val="on"/>
+                          <m:ctrlPr>
+                            <a:rPr lang="en-US" altLang="ko-KR" sz="2400" b="0" i="1" smtClean="0">
+                              <a:solidFill>
+                                <a:sysClr val="windowText" lastClr="000000"/>
+                              </a:solidFill>
+                              <a:latin typeface="Cambria Math"/>
+                            </a:rPr>
+                          </m:ctrlPr>
+                        </m:radPr>
+                        <m:deg/>
+                        <m:e>
+                          <m:sSup>
+                            <m:sSupPr>
+                              <m:ctrlPr>
+                                <a:rPr lang="en-US" altLang="ko-KR" sz="2400" b="0" i="1" smtClean="0">
+                                  <a:solidFill>
+                                    <a:sysClr val="windowText" lastClr="000000"/>
+                                  </a:solidFill>
+                                  <a:latin typeface="Cambria Math"/>
+                                </a:rPr>
+                              </m:ctrlPr>
+                            </m:sSupPr>
+                            <m:e>
+                              <m:r>
+                                <a:rPr lang="en-US" altLang="ko-KR" sz="2400" b="0" i="1" smtClean="0">
+                                  <a:solidFill>
+                                    <a:sysClr val="windowText" lastClr="000000"/>
+                                  </a:solidFill>
+                                  <a:latin typeface="Cambria Math"/>
+                                </a:rPr>
+                                <m:t>2</m:t>
+                              </m:r>
+                            </m:e>
+                            <m:sup>
+                              <m:r>
+                                <a:rPr lang="en-US" altLang="ko-KR" sz="2400" b="0" i="1" smtClean="0">
+                                  <a:solidFill>
+                                    <a:sysClr val="windowText" lastClr="000000"/>
+                                  </a:solidFill>
+                                  <a:latin typeface="Cambria Math"/>
+                                </a:rPr>
+                                <m:t>2</m:t>
+                              </m:r>
+                            </m:sup>
+                          </m:sSup>
+                          <m:r>
+                            <a:rPr lang="en-US" altLang="ko-KR" sz="2400" b="0" i="1" smtClean="0">
+                              <a:solidFill>
+                                <a:sysClr val="windowText" lastClr="000000"/>
+                              </a:solidFill>
+                              <a:latin typeface="Cambria Math"/>
+                            </a:rPr>
+                            <m:t>+</m:t>
+                          </m:r>
+                          <m:sSup>
+                            <m:sSupPr>
+                              <m:ctrlPr>
+                                <a:rPr lang="en-US" altLang="ko-KR" sz="2400" b="0" i="1" smtClean="0">
+                                  <a:solidFill>
+                                    <a:sysClr val="windowText" lastClr="000000"/>
+                                  </a:solidFill>
+                                  <a:latin typeface="Cambria Math"/>
+                                </a:rPr>
+                              </m:ctrlPr>
+                            </m:sSupPr>
+                            <m:e>
+                              <m:r>
+                                <a:rPr lang="en-US" altLang="ko-KR" sz="2400" b="0" i="1" smtClean="0">
+                                  <a:solidFill>
+                                    <a:sysClr val="windowText" lastClr="000000"/>
+                                  </a:solidFill>
+                                  <a:latin typeface="Cambria Math"/>
+                                </a:rPr>
+                                <m:t>4</m:t>
+                              </m:r>
+                            </m:e>
+                            <m:sup>
+                              <m:r>
+                                <a:rPr lang="en-US" altLang="ko-KR" sz="2400" b="0" i="1" smtClean="0">
+                                  <a:solidFill>
+                                    <a:sysClr val="windowText" lastClr="000000"/>
+                                  </a:solidFill>
+                                  <a:latin typeface="Cambria Math"/>
+                                </a:rPr>
+                                <m:t>2</m:t>
+                              </m:r>
+                            </m:sup>
+                          </m:sSup>
+                        </m:e>
+                      </m:rad>
+                    </m:oMath>
+                  </m:oMathPara>
+                </a14:m>
+                <a:endParaRPr lang="ko-KR" altLang="en-US" sz="2400" dirty="0">
+                  <a:solidFill>
+                    <a:sysClr val="windowText" lastClr="000000"/>
+                  </a:solidFill>
+                </a:endParaRPr>
+              </a:p>
+            </p:txBody>
+          </p:sp>
+        </mc:Choice>
+        <mc:Fallback>
+          <p:sp>
+            <p:nvSpPr>
+              <p:cNvPr id="9" name="TextBox 8"/>
+              <p:cNvSpPr txBox="1">
+                <a:spLocks noRot="1" noChangeAspect="1" noMove="1" noResize="1" noEditPoints="1" noAdjustHandles="1" noChangeArrowheads="1" noChangeShapeType="1" noTextEdit="1"/>
+              </p:cNvSpPr>
+              <p:nvPr/>
+            </p:nvSpPr>
+            <p:spPr>
+              <a:xfrm>
+                <a:off x="6178766" y="3065810"/>
+                <a:ext cx="1513363" cy="549766"/>
+              </a:xfrm>
+              <a:prstGeom prst="rect">
+                <a:avLst/>
+              </a:prstGeom>
+              <a:blipFill rotWithShape="1">
+                <a:blip r:embed="rId5"/>
+                <a:stretch>
+                  <a:fillRect/>
+                </a:stretch>
+              </a:blipFill>
+            </p:spPr>
+            <p:txBody>
+              <a:bodyPr/>
+              <a:lstStyle/>
+              <a:p>
+                <a:r>
+                  <a:rPr lang="ko-KR" altLang="en-US">
+                    <a:noFill/>
+                  </a:rPr>
+                  <a:t> </a:t>
+                </a:r>
+              </a:p>
+            </p:txBody>
+          </p:sp>
+        </mc:Fallback>
+      </mc:AlternateContent>
+    </p:spTree>
+    <p:extLst>
+      <p:ext uri="{BB962C8B-B14F-4D97-AF65-F5344CB8AC3E}">
+        <p14:creationId xmlns:p14="http://schemas.microsoft.com/office/powerpoint/2010/main" val="2429377905"/>
       </p:ext>
     </p:extLst>
   </p:cSld>
@@ -4608,7 +5480,7 @@
     </a:clrScheme>
     <a:fontScheme name="Office">
       <a:majorFont>
-        <a:latin typeface="맑은 고딕" panose="020F0302020204030204"/>
+        <a:latin typeface="맑은 고딕"/>
         <a:ea typeface=""/>
         <a:cs typeface=""/>
         <a:font script="Jpan" typeface="游ゴシック Light"/>
@@ -4660,7 +5532,7 @@
         <a:font script="Tfng" typeface="Ebrima"/>
       </a:majorFont>
       <a:minorFont>
-        <a:latin typeface="맑은 고딕" panose="020F0502020204030204"/>
+        <a:latin typeface="맑은 고딕"/>
         <a:ea typeface=""/>
         <a:cs typeface=""/>
         <a:font script="Jpan" typeface="游ゴシック"/>
@@ -4854,7 +5726,7 @@
   <a:extraClrSchemeLst/>
   <a:extLst>
     <a:ext uri="{05A4C25C-085E-4340-85A3-A5531E510DB2}">
-      <thm15:themeFamily xmlns:thm15="http://schemas.microsoft.com/office/thememl/2012/main" name="Office Theme" id="{62F939B6-93AF-4DB8-9C6B-D6C7DFDC589F}" vid="{4A3C46E8-61CC-4603-A589-7422A47A8E4A}"/>
+      <thm15:themeFamily xmlns="" xmlns:thm15="http://schemas.microsoft.com/office/thememl/2012/main" name="Office Theme" id="{62F939B6-93AF-4DB8-9C6B-D6C7DFDC589F}" vid="{4A3C46E8-61CC-4603-A589-7422A47A8E4A}"/>
     </a:ext>
   </a:extLst>
 </a:theme>

</xml_diff>